<commit_message>
Test trigger added; documentation adapted (RFW-TestConcept)
</commit_message>
<xml_diff>
--- a/test/documentation/RFW-TestConcept.pptx
+++ b/test/documentation/RFW-TestConcept.pptx
@@ -5,7 +5,7 @@
     <p:sldMasterId id="2147483708" r:id="rId3"/>
   </p:sldMasterIdLst>
   <p:notesMasterIdLst>
-    <p:notesMasterId r:id="rId13"/>
+    <p:notesMasterId r:id="rId16"/>
   </p:notesMasterIdLst>
   <p:sldIdLst>
     <p:sldId id="256" r:id="rId4"/>
@@ -16,12 +16,15 @@
     <p:sldId id="296" r:id="rId9"/>
     <p:sldId id="299" r:id="rId10"/>
     <p:sldId id="300" r:id="rId11"/>
-    <p:sldId id="301" r:id="rId12"/>
+    <p:sldId id="302" r:id="rId12"/>
+    <p:sldId id="301" r:id="rId13"/>
+    <p:sldId id="303" r:id="rId14"/>
+    <p:sldId id="304" r:id="rId15"/>
   </p:sldIdLst>
   <p:sldSz cx="10969625" cy="6170613"/>
   <p:notesSz cx="6858000" cy="9144000"/>
   <p:custDataLst>
-    <p:tags r:id="rId14"/>
+    <p:tags r:id="rId17"/>
   </p:custDataLst>
   <p:defaultTextStyle>
     <a:defPPr>
@@ -161,7 +164,10 @@
             <p14:sldId id="296"/>
             <p14:sldId id="299"/>
             <p14:sldId id="300"/>
+            <p14:sldId id="302"/>
             <p14:sldId id="301"/>
+            <p14:sldId id="303"/>
+            <p14:sldId id="304"/>
           </p14:sldIdLst>
         </p14:section>
       </p14:sectionLst>
@@ -255,7 +261,7 @@
           <a:p>
             <a:fld id="{6007911F-CEAF-4F0B-98BD-EFB38C6572AA}" type="datetimeFigureOut">
               <a:rPr lang="de-DE" smtClean="0"/>
-              <a:t>09.09.2022</a:t>
+              <a:t>26.09.2022</a:t>
             </a:fld>
             <a:endParaRPr lang="de-DE"/>
           </a:p>
@@ -8666,7 +8672,7 @@
                 <a:uFillTx/>
                 <a:latin typeface="Bosch Office Sans" pitchFamily="2" charset="0"/>
               </a:rPr>
-              <a:t> | Cross-Domain Computing Solutions | XC-CT/ECA3 | 2022-09-09</a:t>
+              <a:t> | Cross-Domain Computing Solutions | XC-CT/ECA3 | 2022-09-26</a:t>
             </a:r>
           </a:p>
         </p:txBody>
@@ -9226,6 +9232,1262 @@
 </p:sld>
 </file>
 
+<file path=ppt/slides/slide10.xml><?xml version="1.0" encoding="utf-8"?>
+<p:sld xmlns:a="http://schemas.openxmlformats.org/drawingml/2006/main" xmlns:r="http://schemas.openxmlformats.org/officeDocument/2006/relationships" xmlns:p="http://schemas.openxmlformats.org/presentationml/2006/main">
+  <p:cSld>
+    <p:spTree>
+      <p:nvGrpSpPr>
+        <p:cNvPr id="1" name=""/>
+        <p:cNvGrpSpPr/>
+        <p:nvPr/>
+      </p:nvGrpSpPr>
+      <p:grpSpPr>
+        <a:xfrm>
+          <a:off x="0" y="0"/>
+          <a:ext cx="0" cy="0"/>
+          <a:chOff x="0" y="0"/>
+          <a:chExt cx="0" cy="0"/>
+        </a:xfrm>
+      </p:grpSpPr>
+      <p:sp>
+        <p:nvSpPr>
+          <p:cNvPr id="3" name="Textplatzhalter 2"/>
+          <p:cNvSpPr>
+            <a:spLocks noGrp="1"/>
+          </p:cNvSpPr>
+          <p:nvPr>
+            <p:ph type="body" sz="quarter" idx="15"/>
+          </p:nvPr>
+        </p:nvSpPr>
+        <p:spPr/>
+        <p:txBody>
+          <a:bodyPr/>
+          <a:lstStyle/>
+          <a:p>
+            <a:r>
+              <a:rPr lang="de-DE"/>
+              <a:t>Test trigger configuration (1/3)</a:t>
+            </a:r>
+            <a:endParaRPr lang="en-US"/>
+          </a:p>
+        </p:txBody>
+      </p:sp>
+      <p:sp>
+        <p:nvSpPr>
+          <p:cNvPr id="4" name="Foliennummernplatzhalter 3"/>
+          <p:cNvSpPr>
+            <a:spLocks noGrp="1"/>
+          </p:cNvSpPr>
+          <p:nvPr>
+            <p:ph type="sldNum" sz="quarter" idx="12"/>
+          </p:nvPr>
+        </p:nvSpPr>
+        <p:spPr/>
+        <p:txBody>
+          <a:bodyPr/>
+          <a:lstStyle/>
+          <a:p>
+            <a:fld id="{4898AEC0-503E-4FA4-859C-D0F72D6E3F79}" type="slidenum">
+              <a:rPr lang="en-US" noProof="1" smtClean="0"/>
+              <a:pPr/>
+              <a:t>10</a:t>
+            </a:fld>
+            <a:endParaRPr lang="en-US" noProof="1"/>
+          </a:p>
+        </p:txBody>
+      </p:sp>
+      <p:sp>
+        <p:nvSpPr>
+          <p:cNvPr id="5" name="Textfeld 4">
+            <a:extLst>
+              <a:ext uri="{FF2B5EF4-FFF2-40B4-BE49-F238E27FC236}">
+                <a16:creationId xmlns:a16="http://schemas.microsoft.com/office/drawing/2014/main" id="{5596A014-59C1-4023-9E24-CBE512BE9691}"/>
+              </a:ext>
+            </a:extLst>
+          </p:cNvPr>
+          <p:cNvSpPr txBox="1"/>
+          <p:nvPr/>
+        </p:nvSpPr>
+        <p:spPr>
+          <a:xfrm>
+            <a:off x="266700" y="813816"/>
+            <a:ext cx="10443300" cy="4700016"/>
+          </a:xfrm>
+          <a:prstGeom prst="rect">
+            <a:avLst/>
+          </a:prstGeom>
+          <a:noFill/>
+        </p:spPr>
+        <p:txBody>
+          <a:bodyPr wrap="square" lIns="0" tIns="0" rIns="0" bIns="0" rtlCol="0">
+            <a:noAutofit/>
+          </a:bodyPr>
+          <a:lstStyle/>
+          <a:p>
+            <a:pPr fontAlgn="auto">
+              <a:spcBef>
+                <a:spcPts val="500"/>
+              </a:spcBef>
+              <a:spcAft>
+                <a:spcPts val="0"/>
+              </a:spcAft>
+            </a:pPr>
+            <a:r>
+              <a:rPr lang="de-DE" sz="1200" b="1" kern="0">
+                <a:solidFill>
+                  <a:srgbClr val="000000"/>
+                </a:solidFill>
+              </a:rPr>
+              <a:t>The test trigger configuration needs to define the following things:</a:t>
+            </a:r>
+          </a:p>
+          <a:p>
+            <a:pPr marR="0" defTabSz="914400" eaLnBrk="1" fontAlgn="auto" latinLnBrk="0" hangingPunct="1">
+              <a:spcBef>
+                <a:spcPts val="500"/>
+              </a:spcBef>
+              <a:spcAft>
+                <a:spcPts val="0"/>
+              </a:spcAft>
+              <a:buClrTx/>
+              <a:buSzTx/>
+              <a:buFontTx/>
+              <a:buNone/>
+              <a:tabLst/>
+            </a:pPr>
+            <a:endParaRPr lang="de-DE" sz="1200" kern="0">
+              <a:solidFill>
+                <a:srgbClr val="000000"/>
+              </a:solidFill>
+            </a:endParaRPr>
+          </a:p>
+          <a:p>
+            <a:pPr marL="171450" marR="0" indent="-171450" defTabSz="914400" eaLnBrk="1" fontAlgn="auto" latinLnBrk="0" hangingPunct="1">
+              <a:spcBef>
+                <a:spcPts val="500"/>
+              </a:spcBef>
+              <a:spcAft>
+                <a:spcPts val="0"/>
+              </a:spcAft>
+              <a:buClrTx/>
+              <a:buSzTx/>
+              <a:buFont typeface="Arial" panose="020B0604020202020204" pitchFamily="34" charset="0"/>
+              <a:buChar char="•"/>
+              <a:tabLst/>
+            </a:pPr>
+            <a:r>
+              <a:rPr lang="de-DE" sz="1200" kern="0">
+                <a:solidFill>
+                  <a:srgbClr val="000000"/>
+                </a:solidFill>
+              </a:rPr>
+              <a:t>Which repositories to consider (in case of the repository contains tests that shall be executed)</a:t>
+            </a:r>
+          </a:p>
+          <a:p>
+            <a:pPr marL="171450" marR="0" indent="-171450" defTabSz="914400" eaLnBrk="1" fontAlgn="auto" latinLnBrk="0" hangingPunct="1">
+              <a:spcBef>
+                <a:spcPts val="500"/>
+              </a:spcBef>
+              <a:spcAft>
+                <a:spcPts val="0"/>
+              </a:spcAft>
+              <a:buClrTx/>
+              <a:buSzTx/>
+              <a:buFont typeface="Arial" panose="020B0604020202020204" pitchFamily="34" charset="0"/>
+              <a:buChar char="•"/>
+              <a:tabLst/>
+            </a:pPr>
+            <a:r>
+              <a:rPr lang="de-DE" sz="1200" kern="0">
+                <a:solidFill>
+                  <a:srgbClr val="000000"/>
+                </a:solidFill>
+              </a:rPr>
+              <a:t>Position of test folders within a repository (repository and test folder are handled separately because one repository can contain more than one test folder (in case of tests of different types)</a:t>
+            </a:r>
+          </a:p>
+          <a:p>
+            <a:pPr marL="171450" marR="0" indent="-171450" defTabSz="914400" eaLnBrk="1" fontAlgn="auto" latinLnBrk="0" hangingPunct="1">
+              <a:spcBef>
+                <a:spcPts val="500"/>
+              </a:spcBef>
+              <a:spcAft>
+                <a:spcPts val="0"/>
+              </a:spcAft>
+              <a:buClrTx/>
+              <a:buSzTx/>
+              <a:buFont typeface="Arial" panose="020B0604020202020204" pitchFamily="34" charset="0"/>
+              <a:buChar char="•"/>
+              <a:tabLst/>
+            </a:pPr>
+            <a:r>
+              <a:rPr lang="de-DE" sz="1200" kern="0">
+                <a:solidFill>
+                  <a:srgbClr val="000000"/>
+                </a:solidFill>
+              </a:rPr>
+              <a:t>Type of the test within the test folder (ROBOT, PYTEST)</a:t>
+            </a:r>
+          </a:p>
+          <a:p>
+            <a:pPr marL="171450" marR="0" indent="-171450" defTabSz="914400" eaLnBrk="1" fontAlgn="auto" latinLnBrk="0" hangingPunct="1">
+              <a:spcBef>
+                <a:spcPts val="500"/>
+              </a:spcBef>
+              <a:spcAft>
+                <a:spcPts val="0"/>
+              </a:spcAft>
+              <a:buClrTx/>
+              <a:buSzTx/>
+              <a:buFont typeface="Arial" panose="020B0604020202020204" pitchFamily="34" charset="0"/>
+              <a:buChar char="•"/>
+              <a:tabLst/>
+            </a:pPr>
+            <a:r>
+              <a:rPr lang="de-DE" sz="1200" kern="0">
+                <a:solidFill>
+                  <a:srgbClr val="000000"/>
+                </a:solidFill>
+              </a:rPr>
+              <a:t>Name of the test executor within the test folder</a:t>
+            </a:r>
+          </a:p>
+          <a:p>
+            <a:pPr marL="171450" marR="0" indent="-171450" defTabSz="914400" eaLnBrk="1" fontAlgn="auto" latinLnBrk="0" hangingPunct="1">
+              <a:spcBef>
+                <a:spcPts val="500"/>
+              </a:spcBef>
+              <a:spcAft>
+                <a:spcPts val="0"/>
+              </a:spcAft>
+              <a:buClrTx/>
+              <a:buSzTx/>
+              <a:buFont typeface="Arial" panose="020B0604020202020204" pitchFamily="34" charset="0"/>
+              <a:buChar char="•"/>
+              <a:tabLst/>
+            </a:pPr>
+            <a:r>
+              <a:rPr lang="de-DE" sz="1200" kern="0">
+                <a:solidFill>
+                  <a:srgbClr val="000000"/>
+                </a:solidFill>
+              </a:rPr>
+              <a:t>Where to let the test executor save the test results</a:t>
+            </a:r>
+          </a:p>
+          <a:p>
+            <a:pPr marL="171450" marR="0" indent="-171450" defTabSz="914400" eaLnBrk="1" fontAlgn="auto" latinLnBrk="0" hangingPunct="1">
+              <a:spcBef>
+                <a:spcPts val="500"/>
+              </a:spcBef>
+              <a:spcAft>
+                <a:spcPts val="0"/>
+              </a:spcAft>
+              <a:buClrTx/>
+              <a:buSzTx/>
+              <a:buFont typeface="Arial" panose="020B0604020202020204" pitchFamily="34" charset="0"/>
+              <a:buChar char="•"/>
+              <a:tabLst/>
+            </a:pPr>
+            <a:r>
+              <a:rPr lang="de-DE" sz="1200" kern="0">
+                <a:solidFill>
+                  <a:srgbClr val="000000"/>
+                </a:solidFill>
+              </a:rPr>
+              <a:t>Which database executor is required to write the test results to database</a:t>
+            </a:r>
+          </a:p>
+          <a:p>
+            <a:pPr marL="171450" marR="0" indent="-171450" defTabSz="914400" eaLnBrk="1" fontAlgn="auto" latinLnBrk="0" hangingPunct="1">
+              <a:spcBef>
+                <a:spcPts val="500"/>
+              </a:spcBef>
+              <a:spcAft>
+                <a:spcPts val="0"/>
+              </a:spcAft>
+              <a:buClrTx/>
+              <a:buSzTx/>
+              <a:buFont typeface="Arial" panose="020B0604020202020204" pitchFamily="34" charset="0"/>
+              <a:buChar char="•"/>
+              <a:tabLst/>
+            </a:pPr>
+            <a:r>
+              <a:rPr lang="de-DE" sz="1200" kern="0">
+                <a:solidFill>
+                  <a:srgbClr val="000000"/>
+                </a:solidFill>
+              </a:rPr>
+              <a:t>Which additional json configuration file is required in command line of database executor (</a:t>
+            </a:r>
+            <a:r>
+              <a:rPr lang="de-DE" sz="1200" i="1" kern="0">
+                <a:solidFill>
+                  <a:srgbClr val="C00000"/>
+                </a:solidFill>
+              </a:rPr>
+              <a:t>to be clarified: test type specific or one single file for all?</a:t>
+            </a:r>
+            <a:r>
+              <a:rPr lang="de-DE" sz="1200" kern="0">
+                <a:solidFill>
+                  <a:srgbClr val="000000"/>
+                </a:solidFill>
+              </a:rPr>
+              <a:t>)</a:t>
+            </a:r>
+          </a:p>
+          <a:p>
+            <a:pPr marR="0" defTabSz="914400" eaLnBrk="1" fontAlgn="auto" latinLnBrk="0" hangingPunct="1">
+              <a:spcBef>
+                <a:spcPts val="500"/>
+              </a:spcBef>
+              <a:spcAft>
+                <a:spcPts val="0"/>
+              </a:spcAft>
+              <a:buClrTx/>
+              <a:buSzTx/>
+              <a:tabLst/>
+            </a:pPr>
+            <a:endParaRPr lang="de-DE" sz="1200" kern="0">
+              <a:solidFill>
+                <a:srgbClr val="000000"/>
+              </a:solidFill>
+            </a:endParaRPr>
+          </a:p>
+          <a:p>
+            <a:pPr marR="0" defTabSz="914400" eaLnBrk="1" fontAlgn="auto" latinLnBrk="0" hangingPunct="1">
+              <a:spcBef>
+                <a:spcPts val="500"/>
+              </a:spcBef>
+              <a:spcAft>
+                <a:spcPts val="0"/>
+              </a:spcAft>
+              <a:buClrTx/>
+              <a:buSzTx/>
+              <a:tabLst/>
+            </a:pPr>
+            <a:endParaRPr lang="de-DE" sz="1200" kern="0">
+              <a:solidFill>
+                <a:srgbClr val="000000"/>
+              </a:solidFill>
+            </a:endParaRPr>
+          </a:p>
+        </p:txBody>
+      </p:sp>
+    </p:spTree>
+    <p:extLst>
+      <p:ext uri="{BB962C8B-B14F-4D97-AF65-F5344CB8AC3E}">
+        <p14:creationId xmlns:p14="http://schemas.microsoft.com/office/powerpoint/2010/main" val="3564699658"/>
+      </p:ext>
+    </p:extLst>
+  </p:cSld>
+  <p:clrMapOvr>
+    <a:masterClrMapping/>
+  </p:clrMapOvr>
+</p:sld>
+</file>
+
+<file path=ppt/slides/slide11.xml><?xml version="1.0" encoding="utf-8"?>
+<p:sld xmlns:a="http://schemas.openxmlformats.org/drawingml/2006/main" xmlns:r="http://schemas.openxmlformats.org/officeDocument/2006/relationships" xmlns:p="http://schemas.openxmlformats.org/presentationml/2006/main">
+  <p:cSld>
+    <p:spTree>
+      <p:nvGrpSpPr>
+        <p:cNvPr id="1" name=""/>
+        <p:cNvGrpSpPr/>
+        <p:nvPr/>
+      </p:nvGrpSpPr>
+      <p:grpSpPr>
+        <a:xfrm>
+          <a:off x="0" y="0"/>
+          <a:ext cx="0" cy="0"/>
+          <a:chOff x="0" y="0"/>
+          <a:chExt cx="0" cy="0"/>
+        </a:xfrm>
+      </p:grpSpPr>
+      <p:sp>
+        <p:nvSpPr>
+          <p:cNvPr id="3" name="Textplatzhalter 2"/>
+          <p:cNvSpPr>
+            <a:spLocks noGrp="1"/>
+          </p:cNvSpPr>
+          <p:nvPr>
+            <p:ph type="body" sz="quarter" idx="15"/>
+          </p:nvPr>
+        </p:nvSpPr>
+        <p:spPr/>
+        <p:txBody>
+          <a:bodyPr/>
+          <a:lstStyle/>
+          <a:p>
+            <a:r>
+              <a:rPr lang="de-DE"/>
+              <a:t>Test trigger configuration (2/3)</a:t>
+            </a:r>
+            <a:endParaRPr lang="en-US"/>
+          </a:p>
+        </p:txBody>
+      </p:sp>
+      <p:sp>
+        <p:nvSpPr>
+          <p:cNvPr id="4" name="Foliennummernplatzhalter 3"/>
+          <p:cNvSpPr>
+            <a:spLocks noGrp="1"/>
+          </p:cNvSpPr>
+          <p:nvPr>
+            <p:ph type="sldNum" sz="quarter" idx="12"/>
+          </p:nvPr>
+        </p:nvSpPr>
+        <p:spPr/>
+        <p:txBody>
+          <a:bodyPr/>
+          <a:lstStyle/>
+          <a:p>
+            <a:fld id="{4898AEC0-503E-4FA4-859C-D0F72D6E3F79}" type="slidenum">
+              <a:rPr lang="en-US" noProof="1" smtClean="0"/>
+              <a:pPr/>
+              <a:t>11</a:t>
+            </a:fld>
+            <a:endParaRPr lang="en-US" noProof="1"/>
+          </a:p>
+        </p:txBody>
+      </p:sp>
+      <p:sp>
+        <p:nvSpPr>
+          <p:cNvPr id="5" name="Textfeld 4">
+            <a:extLst>
+              <a:ext uri="{FF2B5EF4-FFF2-40B4-BE49-F238E27FC236}">
+                <a16:creationId xmlns:a16="http://schemas.microsoft.com/office/drawing/2014/main" id="{5596A014-59C1-4023-9E24-CBE512BE9691}"/>
+              </a:ext>
+            </a:extLst>
+          </p:cNvPr>
+          <p:cNvSpPr txBox="1"/>
+          <p:nvPr/>
+        </p:nvSpPr>
+        <p:spPr>
+          <a:xfrm>
+            <a:off x="266700" y="813816"/>
+            <a:ext cx="10443300" cy="4700016"/>
+          </a:xfrm>
+          <a:prstGeom prst="rect">
+            <a:avLst/>
+          </a:prstGeom>
+          <a:noFill/>
+        </p:spPr>
+        <p:txBody>
+          <a:bodyPr wrap="square" lIns="0" tIns="0" rIns="0" bIns="0" rtlCol="0">
+            <a:noAutofit/>
+          </a:bodyPr>
+          <a:lstStyle/>
+          <a:p>
+            <a:pPr marR="0" defTabSz="914400" eaLnBrk="1" fontAlgn="auto" latinLnBrk="0" hangingPunct="1">
+              <a:spcBef>
+                <a:spcPts val="500"/>
+              </a:spcBef>
+              <a:spcAft>
+                <a:spcPts val="0"/>
+              </a:spcAft>
+              <a:buClrTx/>
+              <a:buSzTx/>
+              <a:tabLst/>
+            </a:pPr>
+            <a:r>
+              <a:rPr lang="de-DE" sz="1200" kern="0">
+                <a:solidFill>
+                  <a:srgbClr val="000000"/>
+                </a:solidFill>
+              </a:rPr>
+              <a:t>The test trigger configuration is defined within a json file. This file contains two sections: COMPONENTS and TESTTYPES.</a:t>
+            </a:r>
+          </a:p>
+          <a:p>
+            <a:pPr marR="0" defTabSz="914400" eaLnBrk="1" fontAlgn="auto" latinLnBrk="0" hangingPunct="1">
+              <a:spcBef>
+                <a:spcPts val="500"/>
+              </a:spcBef>
+              <a:spcAft>
+                <a:spcPts val="0"/>
+              </a:spcAft>
+              <a:buClrTx/>
+              <a:buSzTx/>
+              <a:tabLst/>
+            </a:pPr>
+            <a:endParaRPr lang="de-DE" sz="1200" kern="0">
+              <a:solidFill>
+                <a:srgbClr val="000000"/>
+              </a:solidFill>
+            </a:endParaRPr>
+          </a:p>
+          <a:p>
+            <a:pPr marL="171450" marR="0" indent="-171450" defTabSz="914400" eaLnBrk="1" fontAlgn="auto" latinLnBrk="0" hangingPunct="1">
+              <a:spcBef>
+                <a:spcPts val="500"/>
+              </a:spcBef>
+              <a:spcAft>
+                <a:spcPts val="0"/>
+              </a:spcAft>
+              <a:buClrTx/>
+              <a:buSzTx/>
+              <a:buFont typeface="Arial" panose="020B0604020202020204" pitchFamily="34" charset="0"/>
+              <a:buChar char="•"/>
+              <a:tabLst/>
+            </a:pPr>
+            <a:r>
+              <a:rPr lang="de-DE" sz="1200" b="1" kern="0">
+                <a:solidFill>
+                  <a:srgbClr val="000000"/>
+                </a:solidFill>
+              </a:rPr>
+              <a:t>COMPONENTS</a:t>
+            </a:r>
+            <a:endParaRPr lang="de-DE" sz="1200" kern="0">
+              <a:solidFill>
+                <a:srgbClr val="000000"/>
+              </a:solidFill>
+            </a:endParaRPr>
+          </a:p>
+          <a:p>
+            <a:pPr marR="0" defTabSz="914400" eaLnBrk="1" fontAlgn="auto" latinLnBrk="0" hangingPunct="1">
+              <a:spcBef>
+                <a:spcPts val="500"/>
+              </a:spcBef>
+              <a:spcAft>
+                <a:spcPts val="0"/>
+              </a:spcAft>
+              <a:buClrTx/>
+              <a:buSzTx/>
+              <a:tabLst/>
+            </a:pPr>
+            <a:endParaRPr lang="de-DE" sz="1200" b="1" kern="0">
+              <a:solidFill>
+                <a:srgbClr val="000000"/>
+              </a:solidFill>
+            </a:endParaRPr>
+          </a:p>
+          <a:p>
+            <a:pPr marR="0" defTabSz="914400" eaLnBrk="1" fontAlgn="auto" latinLnBrk="0" hangingPunct="1">
+              <a:spcBef>
+                <a:spcPts val="500"/>
+              </a:spcBef>
+              <a:spcAft>
+                <a:spcPts val="0"/>
+              </a:spcAft>
+              <a:buClrTx/>
+              <a:buSzTx/>
+              <a:tabLst/>
+            </a:pPr>
+            <a:endParaRPr lang="de-DE" sz="1200" b="1" kern="0">
+              <a:solidFill>
+                <a:srgbClr val="000000"/>
+              </a:solidFill>
+            </a:endParaRPr>
+          </a:p>
+          <a:p>
+            <a:pPr marR="0" defTabSz="914400" eaLnBrk="1" fontAlgn="auto" latinLnBrk="0" hangingPunct="1">
+              <a:spcBef>
+                <a:spcPts val="500"/>
+              </a:spcBef>
+              <a:spcAft>
+                <a:spcPts val="0"/>
+              </a:spcAft>
+              <a:buClrTx/>
+              <a:buSzTx/>
+              <a:tabLst/>
+            </a:pPr>
+            <a:endParaRPr lang="de-DE" sz="1200" b="1" kern="0">
+              <a:solidFill>
+                <a:srgbClr val="000000"/>
+              </a:solidFill>
+            </a:endParaRPr>
+          </a:p>
+          <a:p>
+            <a:pPr marR="0" defTabSz="914400" eaLnBrk="1" fontAlgn="auto" latinLnBrk="0" hangingPunct="1">
+              <a:spcBef>
+                <a:spcPts val="500"/>
+              </a:spcBef>
+              <a:spcAft>
+                <a:spcPts val="0"/>
+              </a:spcAft>
+              <a:buClrTx/>
+              <a:buSzTx/>
+              <a:tabLst/>
+            </a:pPr>
+            <a:endParaRPr lang="de-DE" sz="1200" b="1" kern="0">
+              <a:solidFill>
+                <a:srgbClr val="000000"/>
+              </a:solidFill>
+            </a:endParaRPr>
+          </a:p>
+          <a:p>
+            <a:pPr marR="0" defTabSz="914400" eaLnBrk="1" fontAlgn="auto" latinLnBrk="0" hangingPunct="1">
+              <a:spcBef>
+                <a:spcPts val="500"/>
+              </a:spcBef>
+              <a:spcAft>
+                <a:spcPts val="0"/>
+              </a:spcAft>
+              <a:buClrTx/>
+              <a:buSzTx/>
+              <a:tabLst/>
+            </a:pPr>
+            <a:endParaRPr lang="de-DE" sz="1200" b="1" kern="0">
+              <a:solidFill>
+                <a:srgbClr val="000000"/>
+              </a:solidFill>
+            </a:endParaRPr>
+          </a:p>
+          <a:p>
+            <a:pPr lvl="1" fontAlgn="auto">
+              <a:spcBef>
+                <a:spcPts val="500"/>
+              </a:spcBef>
+              <a:spcAft>
+                <a:spcPts val="0"/>
+              </a:spcAft>
+            </a:pPr>
+            <a:endParaRPr lang="de-DE" sz="1200" kern="0">
+              <a:solidFill>
+                <a:srgbClr val="000000"/>
+              </a:solidFill>
+            </a:endParaRPr>
+          </a:p>
+          <a:p>
+            <a:pPr lvl="1" fontAlgn="auto">
+              <a:spcBef>
+                <a:spcPts val="500"/>
+              </a:spcBef>
+              <a:spcAft>
+                <a:spcPts val="0"/>
+              </a:spcAft>
+            </a:pPr>
+            <a:endParaRPr lang="de-DE" sz="1200" kern="0">
+              <a:solidFill>
+                <a:srgbClr val="000000"/>
+              </a:solidFill>
+            </a:endParaRPr>
+          </a:p>
+          <a:p>
+            <a:pPr lvl="1" fontAlgn="auto">
+              <a:spcBef>
+                <a:spcPts val="500"/>
+              </a:spcBef>
+              <a:spcAft>
+                <a:spcPts val="0"/>
+              </a:spcAft>
+            </a:pPr>
+            <a:r>
+              <a:rPr lang="de-DE" sz="1200" kern="0">
+                <a:solidFill>
+                  <a:srgbClr val="000000"/>
+                </a:solidFill>
+              </a:rPr>
+              <a:t>The COMPONENTS section is a list of test folders. For every test folder the following is defined:</a:t>
+            </a:r>
+          </a:p>
+          <a:p>
+            <a:pPr marL="639737" lvl="1" indent="-228600" fontAlgn="auto">
+              <a:spcBef>
+                <a:spcPts val="500"/>
+              </a:spcBef>
+              <a:spcAft>
+                <a:spcPts val="0"/>
+              </a:spcAft>
+              <a:buFont typeface="Arial" panose="020B0604020202020204" pitchFamily="34" charset="0"/>
+              <a:buChar char="•"/>
+            </a:pPr>
+            <a:r>
+              <a:rPr lang="de-DE" sz="1200" kern="0">
+                <a:solidFill>
+                  <a:srgbClr val="000000"/>
+                </a:solidFill>
+              </a:rPr>
+              <a:t>The root path to the component – that is usually the repository containing the sources of this component</a:t>
+            </a:r>
+          </a:p>
+          <a:p>
+            <a:pPr marL="639737" lvl="1" indent="-228600" fontAlgn="auto">
+              <a:spcBef>
+                <a:spcPts val="500"/>
+              </a:spcBef>
+              <a:spcAft>
+                <a:spcPts val="0"/>
+              </a:spcAft>
+              <a:buFont typeface="Arial" panose="020B0604020202020204" pitchFamily="34" charset="0"/>
+              <a:buChar char="•"/>
+            </a:pPr>
+            <a:r>
+              <a:rPr lang="de-DE" sz="1200" kern="0">
+                <a:solidFill>
+                  <a:srgbClr val="000000"/>
+                </a:solidFill>
+              </a:rPr>
+              <a:t>The test folder containg the test files and the test executor. </a:t>
+            </a:r>
+            <a:r>
+              <a:rPr lang="en-US" sz="1200" kern="0">
+                <a:solidFill>
+                  <a:srgbClr val="000000"/>
+                </a:solidFill>
+              </a:rPr>
+              <a:t>It is postulated that the test folder is a subfolder of the component root path</a:t>
+            </a:r>
+          </a:p>
+          <a:p>
+            <a:pPr marL="639737" lvl="1" indent="-228600" fontAlgn="auto">
+              <a:spcBef>
+                <a:spcPts val="500"/>
+              </a:spcBef>
+              <a:spcAft>
+                <a:spcPts val="0"/>
+              </a:spcAft>
+              <a:buFont typeface="Arial" panose="020B0604020202020204" pitchFamily="34" charset="0"/>
+              <a:buChar char="•"/>
+            </a:pPr>
+            <a:r>
+              <a:rPr lang="en-US" sz="1200" kern="0">
+                <a:solidFill>
+                  <a:srgbClr val="000000"/>
+                </a:solidFill>
+              </a:rPr>
+              <a:t>The name of the test executor. It is postulated that the test executor is placed within the test folder</a:t>
+            </a:r>
+          </a:p>
+          <a:p>
+            <a:pPr marL="639737" lvl="1" indent="-228600" fontAlgn="auto">
+              <a:spcBef>
+                <a:spcPts val="500"/>
+              </a:spcBef>
+              <a:spcAft>
+                <a:spcPts val="0"/>
+              </a:spcAft>
+              <a:buFont typeface="Arial" panose="020B0604020202020204" pitchFamily="34" charset="0"/>
+              <a:buChar char="•"/>
+            </a:pPr>
+            <a:r>
+              <a:rPr lang="en-US" sz="1200" kern="0">
+                <a:solidFill>
+                  <a:srgbClr val="000000"/>
+                </a:solidFill>
+              </a:rPr>
+              <a:t>The type of the test (ROBOT or PYTEST)</a:t>
+            </a:r>
+          </a:p>
+          <a:p>
+            <a:pPr marL="639737" lvl="1" indent="-228600" fontAlgn="auto">
+              <a:spcBef>
+                <a:spcPts val="500"/>
+              </a:spcBef>
+              <a:spcAft>
+                <a:spcPts val="0"/>
+              </a:spcAft>
+              <a:buFont typeface="Arial" panose="020B0604020202020204" pitchFamily="34" charset="0"/>
+              <a:buChar char="•"/>
+            </a:pPr>
+            <a:r>
+              <a:rPr lang="en-US" sz="1200" kern="0">
+                <a:solidFill>
+                  <a:srgbClr val="000000"/>
+                </a:solidFill>
+              </a:rPr>
+              <a:t>The full path and name of the logfile. The full path is created by the test executor. The xml log file is created by the involved test framework.</a:t>
+            </a:r>
+          </a:p>
+          <a:p>
+            <a:pPr marL="639737" lvl="1" indent="-228600" fontAlgn="auto">
+              <a:spcBef>
+                <a:spcPts val="500"/>
+              </a:spcBef>
+              <a:spcAft>
+                <a:spcPts val="0"/>
+              </a:spcAft>
+              <a:buFont typeface="Arial" panose="020B0604020202020204" pitchFamily="34" charset="0"/>
+              <a:buChar char="•"/>
+            </a:pPr>
+            <a:r>
+              <a:rPr lang="en-US" sz="1200" kern="0">
+                <a:solidFill>
+                  <a:srgbClr val="000000"/>
+                </a:solidFill>
+              </a:rPr>
+              <a:t>Instead of relative paths also absolute paths or paths starting with an environment variable, are possible.</a:t>
+            </a:r>
+            <a:endParaRPr lang="de-DE" sz="1200" kern="0">
+              <a:solidFill>
+                <a:srgbClr val="000000"/>
+              </a:solidFill>
+            </a:endParaRPr>
+          </a:p>
+        </p:txBody>
+      </p:sp>
+      <p:pic>
+        <p:nvPicPr>
+          <p:cNvPr id="6" name="Grafik 5">
+            <a:extLst>
+              <a:ext uri="{FF2B5EF4-FFF2-40B4-BE49-F238E27FC236}">
+                <a16:creationId xmlns:a16="http://schemas.microsoft.com/office/drawing/2014/main" id="{B2138C6B-41DC-4E5C-B184-630990D49D34}"/>
+              </a:ext>
+            </a:extLst>
+          </p:cNvPr>
+          <p:cNvPicPr>
+            <a:picLocks noChangeAspect="1"/>
+          </p:cNvPicPr>
+          <p:nvPr/>
+        </p:nvPicPr>
+        <p:blipFill>
+          <a:blip r:embed="rId2"/>
+          <a:stretch>
+            <a:fillRect/>
+          </a:stretch>
+        </p:blipFill>
+        <p:spPr>
+          <a:xfrm>
+            <a:off x="666877" y="1627558"/>
+            <a:ext cx="9097736" cy="1399105"/>
+          </a:xfrm>
+          <a:prstGeom prst="rect">
+            <a:avLst/>
+          </a:prstGeom>
+        </p:spPr>
+      </p:pic>
+    </p:spTree>
+    <p:extLst>
+      <p:ext uri="{BB962C8B-B14F-4D97-AF65-F5344CB8AC3E}">
+        <p14:creationId xmlns:p14="http://schemas.microsoft.com/office/powerpoint/2010/main" val="1472536835"/>
+      </p:ext>
+    </p:extLst>
+  </p:cSld>
+  <p:clrMapOvr>
+    <a:masterClrMapping/>
+  </p:clrMapOvr>
+</p:sld>
+</file>
+
+<file path=ppt/slides/slide12.xml><?xml version="1.0" encoding="utf-8"?>
+<p:sld xmlns:a="http://schemas.openxmlformats.org/drawingml/2006/main" xmlns:r="http://schemas.openxmlformats.org/officeDocument/2006/relationships" xmlns:p="http://schemas.openxmlformats.org/presentationml/2006/main">
+  <p:cSld>
+    <p:spTree>
+      <p:nvGrpSpPr>
+        <p:cNvPr id="1" name=""/>
+        <p:cNvGrpSpPr/>
+        <p:nvPr/>
+      </p:nvGrpSpPr>
+      <p:grpSpPr>
+        <a:xfrm>
+          <a:off x="0" y="0"/>
+          <a:ext cx="0" cy="0"/>
+          <a:chOff x="0" y="0"/>
+          <a:chExt cx="0" cy="0"/>
+        </a:xfrm>
+      </p:grpSpPr>
+      <p:sp>
+        <p:nvSpPr>
+          <p:cNvPr id="3" name="Textplatzhalter 2"/>
+          <p:cNvSpPr>
+            <a:spLocks noGrp="1"/>
+          </p:cNvSpPr>
+          <p:nvPr>
+            <p:ph type="body" sz="quarter" idx="15"/>
+          </p:nvPr>
+        </p:nvSpPr>
+        <p:spPr/>
+        <p:txBody>
+          <a:bodyPr/>
+          <a:lstStyle/>
+          <a:p>
+            <a:r>
+              <a:rPr lang="de-DE"/>
+              <a:t>Test trigger configuration (3/3)</a:t>
+            </a:r>
+            <a:endParaRPr lang="en-US"/>
+          </a:p>
+        </p:txBody>
+      </p:sp>
+      <p:sp>
+        <p:nvSpPr>
+          <p:cNvPr id="4" name="Foliennummernplatzhalter 3"/>
+          <p:cNvSpPr>
+            <a:spLocks noGrp="1"/>
+          </p:cNvSpPr>
+          <p:nvPr>
+            <p:ph type="sldNum" sz="quarter" idx="12"/>
+          </p:nvPr>
+        </p:nvSpPr>
+        <p:spPr/>
+        <p:txBody>
+          <a:bodyPr/>
+          <a:lstStyle/>
+          <a:p>
+            <a:fld id="{4898AEC0-503E-4FA4-859C-D0F72D6E3F79}" type="slidenum">
+              <a:rPr lang="en-US" noProof="1" smtClean="0"/>
+              <a:pPr/>
+              <a:t>12</a:t>
+            </a:fld>
+            <a:endParaRPr lang="en-US" noProof="1"/>
+          </a:p>
+        </p:txBody>
+      </p:sp>
+      <p:sp>
+        <p:nvSpPr>
+          <p:cNvPr id="5" name="Textfeld 4">
+            <a:extLst>
+              <a:ext uri="{FF2B5EF4-FFF2-40B4-BE49-F238E27FC236}">
+                <a16:creationId xmlns:a16="http://schemas.microsoft.com/office/drawing/2014/main" id="{5596A014-59C1-4023-9E24-CBE512BE9691}"/>
+              </a:ext>
+            </a:extLst>
+          </p:cNvPr>
+          <p:cNvSpPr txBox="1"/>
+          <p:nvPr/>
+        </p:nvSpPr>
+        <p:spPr>
+          <a:xfrm>
+            <a:off x="266700" y="813816"/>
+            <a:ext cx="10443300" cy="4700016"/>
+          </a:xfrm>
+          <a:prstGeom prst="rect">
+            <a:avLst/>
+          </a:prstGeom>
+          <a:noFill/>
+        </p:spPr>
+        <p:txBody>
+          <a:bodyPr wrap="square" lIns="0" tIns="0" rIns="0" bIns="0" rtlCol="0">
+            <a:noAutofit/>
+          </a:bodyPr>
+          <a:lstStyle/>
+          <a:p>
+            <a:pPr marL="171450" marR="0" indent="-171450" defTabSz="914400" eaLnBrk="1" fontAlgn="auto" latinLnBrk="0" hangingPunct="1">
+              <a:spcBef>
+                <a:spcPts val="500"/>
+              </a:spcBef>
+              <a:spcAft>
+                <a:spcPts val="0"/>
+              </a:spcAft>
+              <a:buClrTx/>
+              <a:buSzTx/>
+              <a:buFont typeface="Arial" panose="020B0604020202020204" pitchFamily="34" charset="0"/>
+              <a:buChar char="•"/>
+              <a:tabLst/>
+            </a:pPr>
+            <a:r>
+              <a:rPr lang="de-DE" sz="1200" b="1" kern="0">
+                <a:solidFill>
+                  <a:srgbClr val="000000"/>
+                </a:solidFill>
+              </a:rPr>
+              <a:t>TESTTYPES</a:t>
+            </a:r>
+            <a:endParaRPr lang="de-DE" sz="1200" kern="0">
+              <a:solidFill>
+                <a:srgbClr val="000000"/>
+              </a:solidFill>
+            </a:endParaRPr>
+          </a:p>
+          <a:p>
+            <a:pPr marR="0" defTabSz="914400" eaLnBrk="1" fontAlgn="auto" latinLnBrk="0" hangingPunct="1">
+              <a:spcBef>
+                <a:spcPts val="500"/>
+              </a:spcBef>
+              <a:spcAft>
+                <a:spcPts val="0"/>
+              </a:spcAft>
+              <a:buClrTx/>
+              <a:buSzTx/>
+              <a:tabLst/>
+            </a:pPr>
+            <a:endParaRPr lang="de-DE" sz="1200" b="1" kern="0">
+              <a:solidFill>
+                <a:srgbClr val="000000"/>
+              </a:solidFill>
+            </a:endParaRPr>
+          </a:p>
+          <a:p>
+            <a:pPr marR="0" defTabSz="914400" eaLnBrk="1" fontAlgn="auto" latinLnBrk="0" hangingPunct="1">
+              <a:spcBef>
+                <a:spcPts val="500"/>
+              </a:spcBef>
+              <a:spcAft>
+                <a:spcPts val="0"/>
+              </a:spcAft>
+              <a:buClrTx/>
+              <a:buSzTx/>
+              <a:tabLst/>
+            </a:pPr>
+            <a:endParaRPr lang="de-DE" sz="1200" b="1" kern="0">
+              <a:solidFill>
+                <a:srgbClr val="000000"/>
+              </a:solidFill>
+            </a:endParaRPr>
+          </a:p>
+          <a:p>
+            <a:pPr marR="0" defTabSz="914400" eaLnBrk="1" fontAlgn="auto" latinLnBrk="0" hangingPunct="1">
+              <a:spcBef>
+                <a:spcPts val="500"/>
+              </a:spcBef>
+              <a:spcAft>
+                <a:spcPts val="0"/>
+              </a:spcAft>
+              <a:buClrTx/>
+              <a:buSzTx/>
+              <a:tabLst/>
+            </a:pPr>
+            <a:endParaRPr lang="de-DE" sz="1200" b="1" kern="0">
+              <a:solidFill>
+                <a:srgbClr val="000000"/>
+              </a:solidFill>
+            </a:endParaRPr>
+          </a:p>
+          <a:p>
+            <a:pPr marR="0" defTabSz="914400" eaLnBrk="1" fontAlgn="auto" latinLnBrk="0" hangingPunct="1">
+              <a:spcBef>
+                <a:spcPts val="500"/>
+              </a:spcBef>
+              <a:spcAft>
+                <a:spcPts val="0"/>
+              </a:spcAft>
+              <a:buClrTx/>
+              <a:buSzTx/>
+              <a:tabLst/>
+            </a:pPr>
+            <a:endParaRPr lang="de-DE" sz="1200" b="1" kern="0">
+              <a:solidFill>
+                <a:srgbClr val="000000"/>
+              </a:solidFill>
+            </a:endParaRPr>
+          </a:p>
+          <a:p>
+            <a:pPr marR="0" defTabSz="914400" eaLnBrk="1" fontAlgn="auto" latinLnBrk="0" hangingPunct="1">
+              <a:spcBef>
+                <a:spcPts val="500"/>
+              </a:spcBef>
+              <a:spcAft>
+                <a:spcPts val="0"/>
+              </a:spcAft>
+              <a:buClrTx/>
+              <a:buSzTx/>
+              <a:tabLst/>
+            </a:pPr>
+            <a:endParaRPr lang="de-DE" sz="1200" b="1" kern="0">
+              <a:solidFill>
+                <a:srgbClr val="000000"/>
+              </a:solidFill>
+            </a:endParaRPr>
+          </a:p>
+          <a:p>
+            <a:pPr lvl="1" fontAlgn="auto">
+              <a:spcBef>
+                <a:spcPts val="500"/>
+              </a:spcBef>
+              <a:spcAft>
+                <a:spcPts val="0"/>
+              </a:spcAft>
+            </a:pPr>
+            <a:endParaRPr lang="de-DE" sz="1200" kern="0">
+              <a:solidFill>
+                <a:srgbClr val="000000"/>
+              </a:solidFill>
+            </a:endParaRPr>
+          </a:p>
+          <a:p>
+            <a:pPr lvl="1" fontAlgn="auto">
+              <a:spcBef>
+                <a:spcPts val="500"/>
+              </a:spcBef>
+              <a:spcAft>
+                <a:spcPts val="0"/>
+              </a:spcAft>
+            </a:pPr>
+            <a:r>
+              <a:rPr lang="de-DE" sz="1200" kern="0">
+                <a:solidFill>
+                  <a:srgbClr val="000000"/>
+                </a:solidFill>
+              </a:rPr>
+              <a:t>The TESTTYPES section is a dictionary of supported test types. For every test type the following is defined:</a:t>
+            </a:r>
+          </a:p>
+          <a:p>
+            <a:pPr marL="639737" lvl="1" indent="-228600" fontAlgn="auto">
+              <a:spcBef>
+                <a:spcPts val="500"/>
+              </a:spcBef>
+              <a:spcAft>
+                <a:spcPts val="0"/>
+              </a:spcAft>
+              <a:buFont typeface="Arial" panose="020B0604020202020204" pitchFamily="34" charset="0"/>
+              <a:buChar char="•"/>
+            </a:pPr>
+            <a:r>
+              <a:rPr lang="de-DE" sz="1200" kern="0">
+                <a:solidFill>
+                  <a:srgbClr val="000000"/>
+                </a:solidFill>
+              </a:rPr>
+              <a:t>The path and name of the database executor</a:t>
+            </a:r>
+          </a:p>
+          <a:p>
+            <a:pPr marL="639737" lvl="1" indent="-228600" fontAlgn="auto">
+              <a:spcBef>
+                <a:spcPts val="500"/>
+              </a:spcBef>
+              <a:spcAft>
+                <a:spcPts val="0"/>
+              </a:spcAft>
+              <a:buFont typeface="Arial" panose="020B0604020202020204" pitchFamily="34" charset="0"/>
+              <a:buChar char="•"/>
+            </a:pPr>
+            <a:r>
+              <a:rPr lang="de-DE" sz="1200" kern="0">
+                <a:solidFill>
+                  <a:srgbClr val="000000"/>
+                </a:solidFill>
+              </a:rPr>
+              <a:t>The path and name of additionally used json configuration files</a:t>
+            </a:r>
+            <a:endParaRPr lang="en-US" sz="1200" kern="0">
+              <a:solidFill>
+                <a:srgbClr val="000000"/>
+              </a:solidFill>
+            </a:endParaRPr>
+          </a:p>
+          <a:p>
+            <a:pPr marL="639737" lvl="1" indent="-228600" fontAlgn="auto">
+              <a:spcBef>
+                <a:spcPts val="500"/>
+              </a:spcBef>
+              <a:spcAft>
+                <a:spcPts val="0"/>
+              </a:spcAft>
+              <a:buFont typeface="Arial" panose="020B0604020202020204" pitchFamily="34" charset="0"/>
+              <a:buChar char="•"/>
+            </a:pPr>
+            <a:r>
+              <a:rPr lang="en-US" sz="1200" kern="0">
+                <a:solidFill>
+                  <a:srgbClr val="000000"/>
+                </a:solidFill>
+              </a:rPr>
+              <a:t>Additional command line parameters needed for the database executor</a:t>
+            </a:r>
+          </a:p>
+          <a:p>
+            <a:pPr marL="639737" lvl="1" indent="-228600" fontAlgn="auto">
+              <a:spcBef>
+                <a:spcPts val="500"/>
+              </a:spcBef>
+              <a:spcAft>
+                <a:spcPts val="0"/>
+              </a:spcAft>
+              <a:buFont typeface="Arial" panose="020B0604020202020204" pitchFamily="34" charset="0"/>
+              <a:buChar char="•"/>
+            </a:pPr>
+            <a:r>
+              <a:rPr lang="en-US" sz="1200" kern="0">
+                <a:solidFill>
+                  <a:srgbClr val="000000"/>
+                </a:solidFill>
+              </a:rPr>
+              <a:t>Instead of relative paths also absolute paths or paths starting with an environment variable, are possible.</a:t>
+            </a:r>
+            <a:endParaRPr lang="de-DE" sz="1200" kern="0">
+              <a:solidFill>
+                <a:srgbClr val="000000"/>
+              </a:solidFill>
+            </a:endParaRPr>
+          </a:p>
+          <a:p>
+            <a:pPr lvl="1" fontAlgn="auto">
+              <a:spcBef>
+                <a:spcPts val="500"/>
+              </a:spcBef>
+              <a:spcAft>
+                <a:spcPts val="0"/>
+              </a:spcAft>
+            </a:pPr>
+            <a:endParaRPr lang="en-US" sz="1200" kern="0">
+              <a:solidFill>
+                <a:srgbClr val="000000"/>
+              </a:solidFill>
+            </a:endParaRPr>
+          </a:p>
+          <a:p>
+            <a:pPr lvl="1" fontAlgn="auto">
+              <a:spcBef>
+                <a:spcPts val="500"/>
+              </a:spcBef>
+              <a:spcAft>
+                <a:spcPts val="0"/>
+              </a:spcAft>
+            </a:pPr>
+            <a:endParaRPr lang="en-US" sz="1200" kern="0">
+              <a:solidFill>
+                <a:srgbClr val="000000"/>
+              </a:solidFill>
+            </a:endParaRPr>
+          </a:p>
+          <a:p>
+            <a:pPr lvl="1" fontAlgn="auto">
+              <a:spcBef>
+                <a:spcPts val="500"/>
+              </a:spcBef>
+              <a:spcAft>
+                <a:spcPts val="0"/>
+              </a:spcAft>
+            </a:pPr>
+            <a:r>
+              <a:rPr lang="en-US" sz="1200" i="1" kern="0">
+                <a:solidFill>
+                  <a:srgbClr val="C00000"/>
+                </a:solidFill>
+              </a:rPr>
+              <a:t>This part of the test trigger configuration is still under construction, based on temporary mocks and needs more clarifications!</a:t>
+            </a:r>
+          </a:p>
+        </p:txBody>
+      </p:sp>
+      <p:pic>
+        <p:nvPicPr>
+          <p:cNvPr id="7" name="Grafik 6">
+            <a:extLst>
+              <a:ext uri="{FF2B5EF4-FFF2-40B4-BE49-F238E27FC236}">
+                <a16:creationId xmlns:a16="http://schemas.microsoft.com/office/drawing/2014/main" id="{B52A6940-4D8A-4A46-8753-465E747C978E}"/>
+              </a:ext>
+            </a:extLst>
+          </p:cNvPr>
+          <p:cNvPicPr>
+            <a:picLocks noChangeAspect="1"/>
+          </p:cNvPicPr>
+          <p:nvPr/>
+        </p:nvPicPr>
+        <p:blipFill>
+          <a:blip r:embed="rId2"/>
+          <a:stretch>
+            <a:fillRect/>
+          </a:stretch>
+        </p:blipFill>
+        <p:spPr>
+          <a:xfrm>
+            <a:off x="670866" y="1140024"/>
+            <a:ext cx="6964374" cy="1223694"/>
+          </a:xfrm>
+          <a:prstGeom prst="rect">
+            <a:avLst/>
+          </a:prstGeom>
+        </p:spPr>
+      </p:pic>
+    </p:spTree>
+    <p:extLst>
+      <p:ext uri="{BB962C8B-B14F-4D97-AF65-F5344CB8AC3E}">
+        <p14:creationId xmlns:p14="http://schemas.microsoft.com/office/powerpoint/2010/main" val="752764952"/>
+      </p:ext>
+    </p:extLst>
+  </p:cSld>
+  <p:clrMapOvr>
+    <a:masterClrMapping/>
+  </p:clrMapOvr>
+</p:sld>
+</file>
+
 <file path=ppt/slides/slide2.xml><?xml version="1.0" encoding="utf-8"?>
 <p:sld xmlns:a="http://schemas.openxmlformats.org/drawingml/2006/main" xmlns:r="http://schemas.openxmlformats.org/officeDocument/2006/relationships" xmlns:p="http://schemas.openxmlformats.org/presentationml/2006/main">
   <p:cSld>
@@ -9337,7 +10599,7 @@
                   <a:srgbClr val="000000"/>
                 </a:solidFill>
               </a:rPr>
-              <a:t>09.09.2022 / v. 0.3.0</a:t>
+              <a:t>26.09.2022 / v. 0.4.1</a:t>
             </a:r>
           </a:p>
           <a:p>
@@ -15152,8 +16414,8 @@
         </p:nvCxnSpPr>
         <p:spPr>
           <a:xfrm flipH="1" flipV="1">
-            <a:off x="2564683" y="2054419"/>
-            <a:ext cx="4174772" cy="2377552"/>
+            <a:off x="2711675" y="2404772"/>
+            <a:ext cx="4027780" cy="2027200"/>
           </a:xfrm>
           <a:prstGeom prst="straightConnector1">
             <a:avLst/>
@@ -15246,8 +16508,8 @@
         </p:nvSpPr>
         <p:spPr>
           <a:xfrm>
-            <a:off x="284462" y="769089"/>
-            <a:ext cx="2188208" cy="3387107"/>
+            <a:off x="273076" y="775677"/>
+            <a:ext cx="2188208" cy="3943196"/>
           </a:xfrm>
           <a:prstGeom prst="rect">
             <a:avLst/>
@@ -15298,7 +16560,7 @@
         </p:nvSpPr>
         <p:spPr>
           <a:xfrm>
-            <a:off x="364965" y="770101"/>
+            <a:off x="364965" y="777189"/>
             <a:ext cx="1322952" cy="228914"/>
           </a:xfrm>
           <a:prstGeom prst="rect">
@@ -15334,7 +16596,7 @@
                   <a:srgbClr val="000000"/>
                 </a:solidFill>
               </a:rPr>
-              <a:t>build repository</a:t>
+              <a:t>RF AIO repository</a:t>
             </a:r>
             <a:endParaRPr lang="de-DE" sz="1200" i="1" kern="0" dirty="0">
               <a:solidFill>
@@ -15360,9 +16622,9 @@
           <p:nvPr/>
         </p:nvCxnSpPr>
         <p:spPr>
-          <a:xfrm flipH="1" flipV="1">
-            <a:off x="1670565" y="3872289"/>
-            <a:ext cx="534906" cy="15560"/>
+          <a:xfrm flipH="1">
+            <a:off x="1670565" y="4397069"/>
+            <a:ext cx="542120" cy="0"/>
           </a:xfrm>
           <a:prstGeom prst="straightConnector1">
             <a:avLst/>
@@ -15408,7 +16670,7 @@
         </p:nvSpPr>
         <p:spPr>
           <a:xfrm>
-            <a:off x="531825" y="1195501"/>
+            <a:off x="531825" y="1571182"/>
             <a:ext cx="1384256" cy="446430"/>
           </a:xfrm>
           <a:prstGeom prst="rect">
@@ -15464,7 +16726,7 @@
         </p:nvSpPr>
         <p:spPr>
           <a:xfrm>
-            <a:off x="616983" y="1144253"/>
+            <a:off x="616983" y="1519934"/>
             <a:ext cx="1226769" cy="281174"/>
           </a:xfrm>
           <a:prstGeom prst="rect">
@@ -15522,8 +16784,8 @@
         </p:nvSpPr>
         <p:spPr>
           <a:xfrm>
-            <a:off x="851545" y="1349319"/>
-            <a:ext cx="838796" cy="339180"/>
+            <a:off x="851545" y="1725000"/>
+            <a:ext cx="838796" cy="256480"/>
           </a:xfrm>
           <a:prstGeom prst="rect">
             <a:avLst/>
@@ -15590,7 +16852,7 @@
         </p:nvSpPr>
         <p:spPr>
           <a:xfrm>
-            <a:off x="531825" y="1797948"/>
+            <a:off x="531825" y="2173629"/>
             <a:ext cx="1384256" cy="492999"/>
           </a:xfrm>
           <a:prstGeom prst="rect">
@@ -15646,8 +16908,8 @@
         </p:nvSpPr>
         <p:spPr>
           <a:xfrm>
-            <a:off x="616983" y="1773439"/>
-            <a:ext cx="1226769" cy="373692"/>
+            <a:off x="616983" y="2146342"/>
+            <a:ext cx="1226769" cy="298502"/>
           </a:xfrm>
           <a:prstGeom prst="rect">
             <a:avLst/>
@@ -15704,7 +16966,7 @@
         </p:nvSpPr>
         <p:spPr>
           <a:xfrm>
-            <a:off x="850714" y="1986307"/>
+            <a:off x="850714" y="2361988"/>
             <a:ext cx="838796" cy="339180"/>
           </a:xfrm>
           <a:prstGeom prst="rect">
@@ -15772,8 +17034,8 @@
         </p:nvSpPr>
         <p:spPr>
           <a:xfrm>
-            <a:off x="6897659" y="790876"/>
-            <a:ext cx="2155885" cy="1759464"/>
+            <a:off x="6865036" y="777430"/>
+            <a:ext cx="2155885" cy="1992017"/>
           </a:xfrm>
           <a:prstGeom prst="rect">
             <a:avLst/>
@@ -15888,7 +17150,7 @@
         </p:nvSpPr>
         <p:spPr>
           <a:xfrm>
-            <a:off x="7145022" y="1217287"/>
+            <a:off x="7188185" y="1436699"/>
             <a:ext cx="1384256" cy="446430"/>
           </a:xfrm>
           <a:prstGeom prst="rect">
@@ -15944,7 +17206,7 @@
         </p:nvSpPr>
         <p:spPr>
           <a:xfrm>
-            <a:off x="7230180" y="1166039"/>
+            <a:off x="7273343" y="1385451"/>
             <a:ext cx="1226769" cy="281174"/>
           </a:xfrm>
           <a:prstGeom prst="rect">
@@ -16002,7 +17264,7 @@
         </p:nvSpPr>
         <p:spPr>
           <a:xfrm>
-            <a:off x="7361369" y="1371105"/>
+            <a:off x="7404532" y="1590517"/>
             <a:ext cx="1165317" cy="339180"/>
           </a:xfrm>
           <a:prstGeom prst="rect">
@@ -16070,7 +17332,7 @@
         </p:nvSpPr>
         <p:spPr>
           <a:xfrm>
-            <a:off x="7145022" y="1819734"/>
+            <a:off x="7188185" y="2039146"/>
             <a:ext cx="1384256" cy="492999"/>
           </a:xfrm>
           <a:prstGeom prst="rect">
@@ -16126,7 +17388,7 @@
         </p:nvSpPr>
         <p:spPr>
           <a:xfrm>
-            <a:off x="7230180" y="1795225"/>
+            <a:off x="7273343" y="2014637"/>
             <a:ext cx="1226769" cy="373692"/>
           </a:xfrm>
           <a:prstGeom prst="rect">
@@ -16184,7 +17446,7 @@
         </p:nvSpPr>
         <p:spPr>
           <a:xfrm>
-            <a:off x="7384398" y="2008093"/>
+            <a:off x="7427561" y="2227505"/>
             <a:ext cx="838796" cy="266533"/>
           </a:xfrm>
           <a:prstGeom prst="rect">
@@ -16252,8 +17514,8 @@
         </p:nvSpPr>
         <p:spPr>
           <a:xfrm>
-            <a:off x="3727412" y="776347"/>
-            <a:ext cx="2188208" cy="2928467"/>
+            <a:off x="3675550" y="770100"/>
+            <a:ext cx="2188208" cy="3262795"/>
           </a:xfrm>
           <a:prstGeom prst="rect">
             <a:avLst/>
@@ -16368,7 +17630,7 @@
         </p:nvSpPr>
         <p:spPr>
           <a:xfrm>
-            <a:off x="3973774" y="1214150"/>
+            <a:off x="3973774" y="1404650"/>
             <a:ext cx="1652930" cy="446430"/>
           </a:xfrm>
           <a:prstGeom prst="rect">
@@ -16424,7 +17686,7 @@
         </p:nvSpPr>
         <p:spPr>
           <a:xfrm>
-            <a:off x="4058932" y="1162902"/>
+            <a:off x="4058932" y="1353402"/>
             <a:ext cx="1226769" cy="281174"/>
           </a:xfrm>
           <a:prstGeom prst="rect">
@@ -16482,7 +17744,7 @@
         </p:nvSpPr>
         <p:spPr>
           <a:xfrm>
-            <a:off x="4126513" y="1367968"/>
+            <a:off x="4126513" y="1558468"/>
             <a:ext cx="1616478" cy="339180"/>
           </a:xfrm>
           <a:prstGeom prst="rect">
@@ -16550,7 +17812,7 @@
         </p:nvSpPr>
         <p:spPr>
           <a:xfrm>
-            <a:off x="3973774" y="1816597"/>
+            <a:off x="3973774" y="2007097"/>
             <a:ext cx="1652930" cy="492999"/>
           </a:xfrm>
           <a:prstGeom prst="rect">
@@ -16606,7 +17868,7 @@
         </p:nvSpPr>
         <p:spPr>
           <a:xfrm>
-            <a:off x="4058932" y="1792088"/>
+            <a:off x="4058932" y="1982588"/>
             <a:ext cx="1226769" cy="373692"/>
           </a:xfrm>
           <a:prstGeom prst="rect">
@@ -16664,7 +17926,7 @@
         </p:nvSpPr>
         <p:spPr>
           <a:xfrm>
-            <a:off x="4327057" y="2004956"/>
+            <a:off x="4327057" y="2195456"/>
             <a:ext cx="838796" cy="339180"/>
           </a:xfrm>
           <a:prstGeom prst="rect">
@@ -16732,7 +17994,7 @@
         </p:nvSpPr>
         <p:spPr>
           <a:xfrm>
-            <a:off x="3968606" y="2440441"/>
+            <a:off x="3968606" y="2834141"/>
             <a:ext cx="1652930" cy="446430"/>
           </a:xfrm>
           <a:prstGeom prst="rect">
@@ -16788,7 +18050,7 @@
         </p:nvSpPr>
         <p:spPr>
           <a:xfrm>
-            <a:off x="4053764" y="2389193"/>
+            <a:off x="4053764" y="2782893"/>
             <a:ext cx="1226769" cy="281174"/>
           </a:xfrm>
           <a:prstGeom prst="rect">
@@ -16846,8 +18108,8 @@
         </p:nvSpPr>
         <p:spPr>
           <a:xfrm>
-            <a:off x="4311313" y="2594259"/>
-            <a:ext cx="1616478" cy="339180"/>
+            <a:off x="4323425" y="2967126"/>
+            <a:ext cx="1402236" cy="339180"/>
           </a:xfrm>
           <a:prstGeom prst="rect">
             <a:avLst/>
@@ -16914,7 +18176,7 @@
         </p:nvSpPr>
         <p:spPr>
           <a:xfrm>
-            <a:off x="3968606" y="3042888"/>
+            <a:off x="3968606" y="3436588"/>
             <a:ext cx="1652930" cy="492999"/>
           </a:xfrm>
           <a:prstGeom prst="rect">
@@ -16970,7 +18232,7 @@
         </p:nvSpPr>
         <p:spPr>
           <a:xfrm>
-            <a:off x="4053764" y="3018379"/>
+            <a:off x="4053764" y="3412079"/>
             <a:ext cx="1226769" cy="373692"/>
           </a:xfrm>
           <a:prstGeom prst="rect">
@@ -17028,7 +18290,7 @@
         </p:nvSpPr>
         <p:spPr>
           <a:xfrm>
-            <a:off x="4321889" y="3231247"/>
+            <a:off x="4321889" y="3624947"/>
             <a:ext cx="838796" cy="339180"/>
           </a:xfrm>
           <a:prstGeom prst="rect">
@@ -17096,7 +18358,7 @@
         </p:nvSpPr>
         <p:spPr>
           <a:xfrm>
-            <a:off x="527382" y="3740813"/>
+            <a:off x="527382" y="4265593"/>
             <a:ext cx="1143183" cy="262952"/>
           </a:xfrm>
           <a:prstGeom prst="rect">
@@ -17157,7 +18419,7 @@
         </p:nvSpPr>
         <p:spPr>
           <a:xfrm>
-            <a:off x="768534" y="3701755"/>
+            <a:off x="768534" y="4226535"/>
             <a:ext cx="716005" cy="318398"/>
           </a:xfrm>
           <a:prstGeom prst="rect">
@@ -17229,7 +18491,7 @@
         </p:nvSpPr>
         <p:spPr>
           <a:xfrm>
-            <a:off x="527382" y="3235613"/>
+            <a:off x="527382" y="3760393"/>
             <a:ext cx="1133287" cy="298502"/>
           </a:xfrm>
           <a:prstGeom prst="rect">
@@ -17290,7 +18552,7 @@
         </p:nvSpPr>
         <p:spPr>
           <a:xfrm>
-            <a:off x="628414" y="3201581"/>
+            <a:off x="628414" y="3726361"/>
             <a:ext cx="1059503" cy="318398"/>
           </a:xfrm>
           <a:prstGeom prst="rect">
@@ -17352,7 +18614,7 @@
         </p:nvCxnSpPr>
         <p:spPr>
           <a:xfrm flipH="1" flipV="1">
-            <a:off x="1094026" y="3534115"/>
+            <a:off x="1094026" y="4058895"/>
             <a:ext cx="4948" cy="206698"/>
           </a:xfrm>
           <a:prstGeom prst="straightConnector1">
@@ -17360,7 +18622,7 @@
           </a:prstGeom>
           <a:ln w="12700">
             <a:solidFill>
-              <a:srgbClr val="FF0000"/>
+              <a:srgbClr val="00B050"/>
             </a:solidFill>
             <a:headEnd type="triangle" w="med" len="med"/>
             <a:tailEnd type="none" w="med" len="med"/>
@@ -17894,8 +19156,8 @@
         </p:nvCxnSpPr>
         <p:spPr>
           <a:xfrm flipH="1">
-            <a:off x="2205470" y="1425427"/>
-            <a:ext cx="7215" cy="2462420"/>
+            <a:off x="2196732" y="1456997"/>
+            <a:ext cx="7721" cy="2928737"/>
           </a:xfrm>
           <a:prstGeom prst="straightConnector1">
             <a:avLst/>
@@ -17934,14 +19196,14 @@
           </p:cNvPr>
           <p:cNvCxnSpPr>
             <a:cxnSpLocks/>
-            <a:stCxn id="139" idx="3"/>
+            <a:stCxn id="105" idx="3"/>
           </p:cNvCxnSpPr>
           <p:nvPr/>
         </p:nvCxnSpPr>
         <p:spPr>
           <a:xfrm>
-            <a:off x="1916081" y="1418716"/>
-            <a:ext cx="296604" cy="6711"/>
+            <a:off x="1424523" y="1456997"/>
+            <a:ext cx="775866" cy="0"/>
           </a:xfrm>
           <a:prstGeom prst="straightConnector1">
             <a:avLst/>
@@ -17985,7 +19247,7 @@
         </p:nvCxnSpPr>
         <p:spPr>
           <a:xfrm flipH="1" flipV="1">
-            <a:off x="2205471" y="3893865"/>
+            <a:off x="2200389" y="4402244"/>
             <a:ext cx="879637" cy="3952"/>
           </a:xfrm>
           <a:prstGeom prst="straightConnector1">
@@ -18030,8 +19292,8 @@
         </p:nvCxnSpPr>
         <p:spPr>
           <a:xfrm flipH="1">
-            <a:off x="3082516" y="1425427"/>
-            <a:ext cx="7768" cy="1223842"/>
+            <a:off x="3086608" y="1283703"/>
+            <a:ext cx="2292" cy="1437230"/>
           </a:xfrm>
           <a:prstGeom prst="straightConnector1">
             <a:avLst/>
@@ -18070,14 +19332,14 @@
           </p:cNvPr>
           <p:cNvCxnSpPr>
             <a:cxnSpLocks/>
-            <a:stCxn id="103" idx="1"/>
+            <a:stCxn id="107" idx="1"/>
           </p:cNvCxnSpPr>
           <p:nvPr/>
         </p:nvCxnSpPr>
         <p:spPr>
-          <a:xfrm flipH="1" flipV="1">
-            <a:off x="3085108" y="1433103"/>
-            <a:ext cx="888666" cy="4262"/>
+          <a:xfrm flipH="1">
+            <a:off x="3085611" y="1296763"/>
+            <a:ext cx="888205" cy="625"/>
           </a:xfrm>
           <a:prstGeom prst="straightConnector1">
             <a:avLst/>
@@ -18120,9 +19382,9 @@
           <p:nvPr/>
         </p:nvCxnSpPr>
         <p:spPr>
-          <a:xfrm>
-            <a:off x="3085108" y="2655980"/>
-            <a:ext cx="0" cy="1246078"/>
+          <a:xfrm flipH="1">
+            <a:off x="3080026" y="2726108"/>
+            <a:ext cx="6581" cy="1670961"/>
           </a:xfrm>
           <a:prstGeom prst="straightConnector1">
             <a:avLst/>
@@ -18161,14 +19423,14 @@
           </p:cNvPr>
           <p:cNvCxnSpPr>
             <a:cxnSpLocks/>
-            <a:stCxn id="115" idx="1"/>
+            <a:stCxn id="99" idx="1"/>
           </p:cNvCxnSpPr>
           <p:nvPr/>
         </p:nvCxnSpPr>
         <p:spPr>
           <a:xfrm flipH="1" flipV="1">
-            <a:off x="3080026" y="2655980"/>
-            <a:ext cx="888580" cy="7676"/>
+            <a:off x="3072937" y="2719020"/>
+            <a:ext cx="897736" cy="6917"/>
           </a:xfrm>
           <a:prstGeom prst="straightConnector1">
             <a:avLst/>
@@ -18212,8 +19474,8 @@
         </p:nvCxnSpPr>
         <p:spPr>
           <a:xfrm flipH="1">
-            <a:off x="3090284" y="3886533"/>
-            <a:ext cx="2127024" cy="1314"/>
+            <a:off x="3073056" y="4220456"/>
+            <a:ext cx="2128862" cy="186398"/>
           </a:xfrm>
           <a:prstGeom prst="straightConnector1">
             <a:avLst/>
@@ -18257,8 +19519,8 @@
         </p:nvCxnSpPr>
         <p:spPr>
           <a:xfrm flipH="1">
-            <a:off x="5217309" y="3893865"/>
-            <a:ext cx="1293896" cy="0"/>
+            <a:off x="5207001" y="4058013"/>
+            <a:ext cx="1299122" cy="164737"/>
           </a:xfrm>
           <a:prstGeom prst="straightConnector1">
             <a:avLst/>
@@ -18297,14 +19559,14 @@
           </p:cNvPr>
           <p:cNvCxnSpPr>
             <a:cxnSpLocks/>
-            <a:stCxn id="87" idx="1"/>
+            <a:stCxn id="121" idx="1"/>
           </p:cNvCxnSpPr>
           <p:nvPr/>
         </p:nvCxnSpPr>
         <p:spPr>
-          <a:xfrm flipH="1">
-            <a:off x="6516380" y="1440502"/>
-            <a:ext cx="628642" cy="0"/>
+          <a:xfrm flipH="1" flipV="1">
+            <a:off x="6520086" y="1323905"/>
+            <a:ext cx="662373" cy="4575"/>
           </a:xfrm>
           <a:prstGeom prst="straightConnector1">
             <a:avLst/>
@@ -18393,9 +19655,9 @@
           <p:nvPr/>
         </p:nvCxnSpPr>
         <p:spPr>
-          <a:xfrm flipV="1">
-            <a:off x="5208104" y="3902060"/>
-            <a:ext cx="4122" cy="670967"/>
+          <a:xfrm flipH="1" flipV="1">
+            <a:off x="5207000" y="4222750"/>
+            <a:ext cx="1104" cy="350278"/>
           </a:xfrm>
           <a:prstGeom prst="straightConnector1">
             <a:avLst/>
@@ -18622,8 +19884,8 @@
         </p:nvCxnSpPr>
         <p:spPr>
           <a:xfrm flipH="1">
-            <a:off x="1916081" y="2044448"/>
-            <a:ext cx="657621" cy="0"/>
+            <a:off x="1916081" y="2420129"/>
+            <a:ext cx="820031" cy="0"/>
           </a:xfrm>
           <a:prstGeom prst="straightConnector1">
             <a:avLst/>
@@ -18668,7 +19930,7 @@
         </p:nvCxnSpPr>
         <p:spPr>
           <a:xfrm flipH="1" flipV="1">
-            <a:off x="5626704" y="2063097"/>
+            <a:off x="5626704" y="2253597"/>
             <a:ext cx="740803" cy="6331"/>
           </a:xfrm>
           <a:prstGeom prst="straightConnector1">
@@ -18713,8 +19975,8 @@
         </p:nvCxnSpPr>
         <p:spPr>
           <a:xfrm flipH="1">
-            <a:off x="6511205" y="1418716"/>
-            <a:ext cx="14171" cy="2483342"/>
+            <a:off x="6506123" y="1317652"/>
+            <a:ext cx="21757" cy="2737536"/>
           </a:xfrm>
           <a:prstGeom prst="straightConnector1">
             <a:avLst/>
@@ -18759,8 +20021,8 @@
         </p:nvCxnSpPr>
         <p:spPr>
           <a:xfrm flipH="1" flipV="1">
-            <a:off x="6357419" y="2054419"/>
-            <a:ext cx="1516315" cy="2739459"/>
+            <a:off x="6364537" y="2256762"/>
+            <a:ext cx="1509197" cy="2537116"/>
           </a:xfrm>
           <a:prstGeom prst="straightConnector1">
             <a:avLst/>
@@ -18805,9 +20067,9 @@
           <p:nvPr/>
         </p:nvCxnSpPr>
         <p:spPr>
-          <a:xfrm flipH="1" flipV="1">
-            <a:off x="7837150" y="2312733"/>
-            <a:ext cx="36584" cy="2481145"/>
+          <a:xfrm flipV="1">
+            <a:off x="7873734" y="2532145"/>
+            <a:ext cx="6579" cy="2261733"/>
           </a:xfrm>
           <a:prstGeom prst="straightConnector1">
             <a:avLst/>
@@ -18852,7 +20114,7 @@
         </p:nvCxnSpPr>
         <p:spPr>
           <a:xfrm flipH="1">
-            <a:off x="5621536" y="3289388"/>
+            <a:off x="5621536" y="3683088"/>
             <a:ext cx="3340873" cy="0"/>
           </a:xfrm>
           <a:prstGeom prst="straightConnector1">
@@ -18898,8 +20160,8 @@
         </p:nvCxnSpPr>
         <p:spPr>
           <a:xfrm flipH="1" flipV="1">
-            <a:off x="8962409" y="3289387"/>
-            <a:ext cx="4198" cy="1908702"/>
+            <a:off x="8957738" y="3683087"/>
+            <a:ext cx="8869" cy="1515002"/>
           </a:xfrm>
           <a:prstGeom prst="straightConnector1">
             <a:avLst/>
@@ -19200,9 +20462,9 @@
           <p:nvPr/>
         </p:nvCxnSpPr>
         <p:spPr>
-          <a:xfrm flipH="1" flipV="1">
-            <a:off x="8529278" y="1440502"/>
-            <a:ext cx="1588802" cy="6353"/>
+          <a:xfrm flipH="1">
+            <a:off x="8572441" y="1653176"/>
+            <a:ext cx="1545639" cy="6738"/>
           </a:xfrm>
           <a:prstGeom prst="straightConnector1">
             <a:avLst/>
@@ -19247,8 +20509,8 @@
         </p:nvCxnSpPr>
         <p:spPr>
           <a:xfrm flipV="1">
-            <a:off x="10111208" y="1440502"/>
-            <a:ext cx="6872" cy="600419"/>
+            <a:off x="10111208" y="1659914"/>
+            <a:ext cx="6872" cy="381007"/>
           </a:xfrm>
           <a:prstGeom prst="straightConnector1">
             <a:avLst/>
@@ -19294,7 +20556,7 @@
         </p:nvSpPr>
         <p:spPr>
           <a:xfrm>
-            <a:off x="9353897" y="1162902"/>
+            <a:off x="9495678" y="1382203"/>
             <a:ext cx="455157" cy="306296"/>
           </a:xfrm>
           <a:prstGeom prst="rect">
@@ -19599,6 +20861,538 @@
                 </a:solidFill>
               </a:rPr>
               <a:t>Legend:</a:t>
+            </a:r>
+          </a:p>
+          <a:p>
+            <a:pPr>
+              <a:lnSpc>
+                <a:spcPts val="2300"/>
+              </a:lnSpc>
+              <a:spcBef>
+                <a:spcPts val="500"/>
+              </a:spcBef>
+            </a:pPr>
+            <a:endParaRPr kumimoji="0" lang="de-DE" sz="1000" b="1" strike="noStrike" kern="0" cap="none" spc="0" normalizeH="0" baseline="0" noProof="0" dirty="0">
+              <a:ln>
+                <a:noFill/>
+              </a:ln>
+              <a:solidFill>
+                <a:srgbClr val="000000"/>
+              </a:solidFill>
+              <a:effectLst/>
+              <a:uLnTx/>
+              <a:uFillTx/>
+            </a:endParaRPr>
+          </a:p>
+        </p:txBody>
+      </p:sp>
+      <p:sp>
+        <p:nvSpPr>
+          <p:cNvPr id="99" name="Rechteck 98">
+            <a:extLst>
+              <a:ext uri="{FF2B5EF4-FFF2-40B4-BE49-F238E27FC236}">
+                <a16:creationId xmlns:a16="http://schemas.microsoft.com/office/drawing/2014/main" id="{7F787525-CD87-4085-9223-BAD7562818C6}"/>
+              </a:ext>
+            </a:extLst>
+          </p:cNvPr>
+          <p:cNvSpPr/>
+          <p:nvPr>
+            <p:custDataLst>
+              <p:tags r:id="rId37"/>
+            </p:custDataLst>
+          </p:nvPr>
+        </p:nvSpPr>
+        <p:spPr>
+          <a:xfrm>
+            <a:off x="3970673" y="2626180"/>
+            <a:ext cx="892824" cy="199513"/>
+          </a:xfrm>
+          <a:prstGeom prst="rect">
+            <a:avLst/>
+          </a:prstGeom>
+          <a:solidFill>
+            <a:srgbClr val="FFCC99"/>
+          </a:solidFill>
+          <a:ln>
+            <a:solidFill>
+              <a:srgbClr val="FF9900"/>
+            </a:solidFill>
+          </a:ln>
+        </p:spPr>
+        <p:style>
+          <a:lnRef idx="2">
+            <a:schemeClr val="dk1"/>
+          </a:lnRef>
+          <a:fillRef idx="1">
+            <a:schemeClr val="lt1"/>
+          </a:fillRef>
+          <a:effectRef idx="0">
+            <a:schemeClr val="dk1"/>
+          </a:effectRef>
+          <a:fontRef idx="minor">
+            <a:schemeClr val="dk1"/>
+          </a:fontRef>
+        </p:style>
+        <p:txBody>
+          <a:bodyPr rtlCol="0" anchor="ctr"/>
+          <a:lstStyle/>
+          <a:p>
+            <a:pPr algn="ctr"/>
+            <a:endParaRPr lang="de-DE" sz="1000" dirty="0">
+              <a:ln w="0"/>
+              <a:solidFill>
+                <a:schemeClr val="tx1"/>
+              </a:solidFill>
+            </a:endParaRPr>
+          </a:p>
+        </p:txBody>
+      </p:sp>
+      <p:sp>
+        <p:nvSpPr>
+          <p:cNvPr id="101" name="Textfeld 100">
+            <a:extLst>
+              <a:ext uri="{FF2B5EF4-FFF2-40B4-BE49-F238E27FC236}">
+                <a16:creationId xmlns:a16="http://schemas.microsoft.com/office/drawing/2014/main" id="{5A3AB52B-B6B4-4ADC-8210-F783EC923CEA}"/>
+              </a:ext>
+            </a:extLst>
+          </p:cNvPr>
+          <p:cNvSpPr txBox="1"/>
+          <p:nvPr>
+            <p:custDataLst>
+              <p:tags r:id="rId38"/>
+            </p:custDataLst>
+          </p:nvPr>
+        </p:nvSpPr>
+        <p:spPr>
+          <a:xfrm>
+            <a:off x="4042933" y="2555910"/>
+            <a:ext cx="820563" cy="318398"/>
+          </a:xfrm>
+          <a:prstGeom prst="rect">
+            <a:avLst/>
+          </a:prstGeom>
+          <a:noFill/>
+        </p:spPr>
+        <p:txBody>
+          <a:bodyPr wrap="square" lIns="0" tIns="0" rIns="0" bIns="0" rtlCol="0">
+            <a:noAutofit/>
+          </a:bodyPr>
+          <a:lstStyle/>
+          <a:p>
+            <a:pPr>
+              <a:lnSpc>
+                <a:spcPts val="2300"/>
+              </a:lnSpc>
+              <a:spcBef>
+                <a:spcPts val="500"/>
+              </a:spcBef>
+            </a:pPr>
+            <a:r>
+              <a:rPr lang="de-DE" sz="1000" i="1" kern="0">
+                <a:solidFill>
+                  <a:srgbClr val="000000"/>
+                </a:solidFill>
+              </a:rPr>
+              <a:t>test executor</a:t>
+            </a:r>
+          </a:p>
+          <a:p>
+            <a:pPr>
+              <a:lnSpc>
+                <a:spcPts val="2300"/>
+              </a:lnSpc>
+              <a:spcBef>
+                <a:spcPts val="500"/>
+              </a:spcBef>
+            </a:pPr>
+            <a:endParaRPr kumimoji="0" lang="de-DE" sz="1000" b="1" strike="noStrike" kern="0" cap="none" spc="0" normalizeH="0" baseline="0" noProof="0" dirty="0">
+              <a:ln>
+                <a:noFill/>
+              </a:ln>
+              <a:solidFill>
+                <a:srgbClr val="000000"/>
+              </a:solidFill>
+              <a:effectLst/>
+              <a:uLnTx/>
+              <a:uFillTx/>
+            </a:endParaRPr>
+          </a:p>
+        </p:txBody>
+      </p:sp>
+      <p:sp>
+        <p:nvSpPr>
+          <p:cNvPr id="107" name="Rechteck 106">
+            <a:extLst>
+              <a:ext uri="{FF2B5EF4-FFF2-40B4-BE49-F238E27FC236}">
+                <a16:creationId xmlns:a16="http://schemas.microsoft.com/office/drawing/2014/main" id="{7269294E-F102-47B3-9C65-33A4136D0EED}"/>
+              </a:ext>
+            </a:extLst>
+          </p:cNvPr>
+          <p:cNvSpPr/>
+          <p:nvPr>
+            <p:custDataLst>
+              <p:tags r:id="rId39"/>
+            </p:custDataLst>
+          </p:nvPr>
+        </p:nvSpPr>
+        <p:spPr>
+          <a:xfrm>
+            <a:off x="3973816" y="1197006"/>
+            <a:ext cx="892824" cy="199513"/>
+          </a:xfrm>
+          <a:prstGeom prst="rect">
+            <a:avLst/>
+          </a:prstGeom>
+          <a:solidFill>
+            <a:srgbClr val="FFCC99"/>
+          </a:solidFill>
+          <a:ln>
+            <a:solidFill>
+              <a:srgbClr val="FF9900"/>
+            </a:solidFill>
+          </a:ln>
+        </p:spPr>
+        <p:style>
+          <a:lnRef idx="2">
+            <a:schemeClr val="dk1"/>
+          </a:lnRef>
+          <a:fillRef idx="1">
+            <a:schemeClr val="lt1"/>
+          </a:fillRef>
+          <a:effectRef idx="0">
+            <a:schemeClr val="dk1"/>
+          </a:effectRef>
+          <a:fontRef idx="minor">
+            <a:schemeClr val="dk1"/>
+          </a:fontRef>
+        </p:style>
+        <p:txBody>
+          <a:bodyPr rtlCol="0" anchor="ctr"/>
+          <a:lstStyle/>
+          <a:p>
+            <a:pPr algn="ctr"/>
+            <a:endParaRPr lang="de-DE" sz="1000" dirty="0">
+              <a:ln w="0"/>
+              <a:solidFill>
+                <a:schemeClr val="tx1"/>
+              </a:solidFill>
+            </a:endParaRPr>
+          </a:p>
+        </p:txBody>
+      </p:sp>
+      <p:sp>
+        <p:nvSpPr>
+          <p:cNvPr id="109" name="Textfeld 108">
+            <a:extLst>
+              <a:ext uri="{FF2B5EF4-FFF2-40B4-BE49-F238E27FC236}">
+                <a16:creationId xmlns:a16="http://schemas.microsoft.com/office/drawing/2014/main" id="{CB59604B-EF1F-4F2C-A944-A0DDD76CC3CA}"/>
+              </a:ext>
+            </a:extLst>
+          </p:cNvPr>
+          <p:cNvSpPr txBox="1"/>
+          <p:nvPr>
+            <p:custDataLst>
+              <p:tags r:id="rId40"/>
+            </p:custDataLst>
+          </p:nvPr>
+        </p:nvSpPr>
+        <p:spPr>
+          <a:xfrm>
+            <a:off x="4046076" y="1126736"/>
+            <a:ext cx="820563" cy="318398"/>
+          </a:xfrm>
+          <a:prstGeom prst="rect">
+            <a:avLst/>
+          </a:prstGeom>
+          <a:noFill/>
+        </p:spPr>
+        <p:txBody>
+          <a:bodyPr wrap="square" lIns="0" tIns="0" rIns="0" bIns="0" rtlCol="0">
+            <a:noAutofit/>
+          </a:bodyPr>
+          <a:lstStyle/>
+          <a:p>
+            <a:pPr>
+              <a:lnSpc>
+                <a:spcPts val="2300"/>
+              </a:lnSpc>
+              <a:spcBef>
+                <a:spcPts val="500"/>
+              </a:spcBef>
+            </a:pPr>
+            <a:r>
+              <a:rPr lang="de-DE" sz="1000" i="1" kern="0">
+                <a:solidFill>
+                  <a:srgbClr val="000000"/>
+                </a:solidFill>
+              </a:rPr>
+              <a:t>test executor</a:t>
+            </a:r>
+          </a:p>
+          <a:p>
+            <a:pPr>
+              <a:lnSpc>
+                <a:spcPts val="2300"/>
+              </a:lnSpc>
+              <a:spcBef>
+                <a:spcPts val="500"/>
+              </a:spcBef>
+            </a:pPr>
+            <a:endParaRPr kumimoji="0" lang="de-DE" sz="1000" b="1" strike="noStrike" kern="0" cap="none" spc="0" normalizeH="0" baseline="0" noProof="0" dirty="0">
+              <a:ln>
+                <a:noFill/>
+              </a:ln>
+              <a:solidFill>
+                <a:srgbClr val="000000"/>
+              </a:solidFill>
+              <a:effectLst/>
+              <a:uLnTx/>
+              <a:uFillTx/>
+            </a:endParaRPr>
+          </a:p>
+        </p:txBody>
+      </p:sp>
+      <p:sp>
+        <p:nvSpPr>
+          <p:cNvPr id="121" name="Rechteck 120">
+            <a:extLst>
+              <a:ext uri="{FF2B5EF4-FFF2-40B4-BE49-F238E27FC236}">
+                <a16:creationId xmlns:a16="http://schemas.microsoft.com/office/drawing/2014/main" id="{42620C19-20F4-43AD-9C83-BE4A38F1FBCF}"/>
+              </a:ext>
+            </a:extLst>
+          </p:cNvPr>
+          <p:cNvSpPr/>
+          <p:nvPr>
+            <p:custDataLst>
+              <p:tags r:id="rId41"/>
+            </p:custDataLst>
+          </p:nvPr>
+        </p:nvSpPr>
+        <p:spPr>
+          <a:xfrm>
+            <a:off x="7182459" y="1228723"/>
+            <a:ext cx="892824" cy="199513"/>
+          </a:xfrm>
+          <a:prstGeom prst="rect">
+            <a:avLst/>
+          </a:prstGeom>
+          <a:solidFill>
+            <a:srgbClr val="FFCC99"/>
+          </a:solidFill>
+          <a:ln>
+            <a:solidFill>
+              <a:srgbClr val="FF9900"/>
+            </a:solidFill>
+          </a:ln>
+        </p:spPr>
+        <p:style>
+          <a:lnRef idx="2">
+            <a:schemeClr val="dk1"/>
+          </a:lnRef>
+          <a:fillRef idx="1">
+            <a:schemeClr val="lt1"/>
+          </a:fillRef>
+          <a:effectRef idx="0">
+            <a:schemeClr val="dk1"/>
+          </a:effectRef>
+          <a:fontRef idx="minor">
+            <a:schemeClr val="dk1"/>
+          </a:fontRef>
+        </p:style>
+        <p:txBody>
+          <a:bodyPr rtlCol="0" anchor="ctr"/>
+          <a:lstStyle/>
+          <a:p>
+            <a:pPr algn="ctr"/>
+            <a:endParaRPr lang="de-DE" sz="1000" dirty="0">
+              <a:ln w="0"/>
+              <a:solidFill>
+                <a:schemeClr val="tx1"/>
+              </a:solidFill>
+            </a:endParaRPr>
+          </a:p>
+        </p:txBody>
+      </p:sp>
+      <p:sp>
+        <p:nvSpPr>
+          <p:cNvPr id="122" name="Textfeld 121">
+            <a:extLst>
+              <a:ext uri="{FF2B5EF4-FFF2-40B4-BE49-F238E27FC236}">
+                <a16:creationId xmlns:a16="http://schemas.microsoft.com/office/drawing/2014/main" id="{94FC1572-2570-489E-86F7-6638503367CF}"/>
+              </a:ext>
+            </a:extLst>
+          </p:cNvPr>
+          <p:cNvSpPr txBox="1"/>
+          <p:nvPr>
+            <p:custDataLst>
+              <p:tags r:id="rId42"/>
+            </p:custDataLst>
+          </p:nvPr>
+        </p:nvSpPr>
+        <p:spPr>
+          <a:xfrm>
+            <a:off x="7254719" y="1158453"/>
+            <a:ext cx="820563" cy="318398"/>
+          </a:xfrm>
+          <a:prstGeom prst="rect">
+            <a:avLst/>
+          </a:prstGeom>
+          <a:noFill/>
+        </p:spPr>
+        <p:txBody>
+          <a:bodyPr wrap="square" lIns="0" tIns="0" rIns="0" bIns="0" rtlCol="0">
+            <a:noAutofit/>
+          </a:bodyPr>
+          <a:lstStyle/>
+          <a:p>
+            <a:pPr>
+              <a:lnSpc>
+                <a:spcPts val="2300"/>
+              </a:lnSpc>
+              <a:spcBef>
+                <a:spcPts val="500"/>
+              </a:spcBef>
+            </a:pPr>
+            <a:r>
+              <a:rPr lang="de-DE" sz="1000" i="1" kern="0">
+                <a:solidFill>
+                  <a:srgbClr val="000000"/>
+                </a:solidFill>
+              </a:rPr>
+              <a:t>test executor</a:t>
+            </a:r>
+          </a:p>
+          <a:p>
+            <a:pPr>
+              <a:lnSpc>
+                <a:spcPts val="2300"/>
+              </a:lnSpc>
+              <a:spcBef>
+                <a:spcPts val="500"/>
+              </a:spcBef>
+            </a:pPr>
+            <a:endParaRPr kumimoji="0" lang="de-DE" sz="1000" b="1" strike="noStrike" kern="0" cap="none" spc="0" normalizeH="0" baseline="0" noProof="0" dirty="0">
+              <a:ln>
+                <a:noFill/>
+              </a:ln>
+              <a:solidFill>
+                <a:srgbClr val="000000"/>
+              </a:solidFill>
+              <a:effectLst/>
+              <a:uLnTx/>
+              <a:uFillTx/>
+            </a:endParaRPr>
+          </a:p>
+        </p:txBody>
+      </p:sp>
+      <p:sp>
+        <p:nvSpPr>
+          <p:cNvPr id="105" name="Rechteck 104">
+            <a:extLst>
+              <a:ext uri="{FF2B5EF4-FFF2-40B4-BE49-F238E27FC236}">
+                <a16:creationId xmlns:a16="http://schemas.microsoft.com/office/drawing/2014/main" id="{184BE6D9-904B-4DAB-8313-F8B92D15F00E}"/>
+              </a:ext>
+            </a:extLst>
+          </p:cNvPr>
+          <p:cNvSpPr/>
+          <p:nvPr>
+            <p:custDataLst>
+              <p:tags r:id="rId43"/>
+            </p:custDataLst>
+          </p:nvPr>
+        </p:nvSpPr>
+        <p:spPr>
+          <a:xfrm>
+            <a:off x="531699" y="1357240"/>
+            <a:ext cx="892824" cy="199513"/>
+          </a:xfrm>
+          <a:prstGeom prst="rect">
+            <a:avLst/>
+          </a:prstGeom>
+          <a:solidFill>
+            <a:srgbClr val="FFCC99"/>
+          </a:solidFill>
+          <a:ln>
+            <a:solidFill>
+              <a:srgbClr val="FF9900"/>
+            </a:solidFill>
+          </a:ln>
+        </p:spPr>
+        <p:style>
+          <a:lnRef idx="2">
+            <a:schemeClr val="dk1"/>
+          </a:lnRef>
+          <a:fillRef idx="1">
+            <a:schemeClr val="lt1"/>
+          </a:fillRef>
+          <a:effectRef idx="0">
+            <a:schemeClr val="dk1"/>
+          </a:effectRef>
+          <a:fontRef idx="minor">
+            <a:schemeClr val="dk1"/>
+          </a:fontRef>
+        </p:style>
+        <p:txBody>
+          <a:bodyPr rtlCol="0" anchor="ctr"/>
+          <a:lstStyle/>
+          <a:p>
+            <a:pPr algn="ctr"/>
+            <a:endParaRPr lang="de-DE" sz="1000" dirty="0">
+              <a:ln w="0"/>
+              <a:solidFill>
+                <a:schemeClr val="tx1"/>
+              </a:solidFill>
+            </a:endParaRPr>
+          </a:p>
+        </p:txBody>
+      </p:sp>
+      <p:sp>
+        <p:nvSpPr>
+          <p:cNvPr id="106" name="Textfeld 105">
+            <a:extLst>
+              <a:ext uri="{FF2B5EF4-FFF2-40B4-BE49-F238E27FC236}">
+                <a16:creationId xmlns:a16="http://schemas.microsoft.com/office/drawing/2014/main" id="{EE3FCF5B-8EEC-4391-B620-D4B3B402D8D9}"/>
+              </a:ext>
+            </a:extLst>
+          </p:cNvPr>
+          <p:cNvSpPr txBox="1"/>
+          <p:nvPr>
+            <p:custDataLst>
+              <p:tags r:id="rId44"/>
+            </p:custDataLst>
+          </p:nvPr>
+        </p:nvSpPr>
+        <p:spPr>
+          <a:xfrm>
+            <a:off x="603959" y="1286970"/>
+            <a:ext cx="771475" cy="318398"/>
+          </a:xfrm>
+          <a:prstGeom prst="rect">
+            <a:avLst/>
+          </a:prstGeom>
+          <a:noFill/>
+        </p:spPr>
+        <p:txBody>
+          <a:bodyPr wrap="square" lIns="0" tIns="0" rIns="0" bIns="0" rtlCol="0">
+            <a:noAutofit/>
+          </a:bodyPr>
+          <a:lstStyle/>
+          <a:p>
+            <a:pPr>
+              <a:lnSpc>
+                <a:spcPts val="2300"/>
+              </a:lnSpc>
+              <a:spcBef>
+                <a:spcPts val="500"/>
+              </a:spcBef>
+            </a:pPr>
+            <a:r>
+              <a:rPr lang="de-DE" sz="1000" i="1" kern="0">
+                <a:solidFill>
+                  <a:srgbClr val="000000"/>
+                </a:solidFill>
+              </a:rPr>
+              <a:t>test executor</a:t>
             </a:r>
           </a:p>
           <a:p>
@@ -19671,7 +21465,7 @@
           <a:p>
             <a:r>
               <a:rPr lang="de-DE"/>
-              <a:t>Terms</a:t>
+              <a:t>Terms and predefinitions (1/2)</a:t>
             </a:r>
             <a:endParaRPr lang="en-US"/>
           </a:p>
@@ -19729,6 +21523,140 @@
           </a:bodyPr>
           <a:lstStyle/>
           <a:p>
+            <a:pPr marL="171450" indent="-171450" fontAlgn="auto">
+              <a:spcBef>
+                <a:spcPts val="500"/>
+              </a:spcBef>
+              <a:spcAft>
+                <a:spcPts val="0"/>
+              </a:spcAft>
+              <a:buFont typeface="Arial" panose="020B0604020202020204" pitchFamily="34" charset="0"/>
+              <a:buChar char="•"/>
+            </a:pPr>
+            <a:r>
+              <a:rPr lang="de-DE" sz="1200" b="1" kern="0">
+                <a:solidFill>
+                  <a:srgbClr val="000000"/>
+                </a:solidFill>
+              </a:rPr>
+              <a:t>test trigger</a:t>
+            </a:r>
+            <a:endParaRPr lang="de-DE" sz="1200" kern="0">
+              <a:solidFill>
+                <a:srgbClr val="000000"/>
+              </a:solidFill>
+            </a:endParaRPr>
+          </a:p>
+          <a:p>
+            <a:pPr lvl="1" fontAlgn="auto">
+              <a:spcBef>
+                <a:spcPts val="500"/>
+              </a:spcBef>
+              <a:spcAft>
+                <a:spcPts val="0"/>
+              </a:spcAft>
+            </a:pPr>
+            <a:r>
+              <a:rPr lang="de-DE" sz="1200" kern="0">
+                <a:solidFill>
+                  <a:srgbClr val="000000"/>
+                </a:solidFill>
+              </a:rPr>
+              <a:t>Main entry point for the test execution; located within the RobotFramework AIO repository; manages the execution of all test related applications in all configured local test folders and therefore triggers the complete test (= command line call of all configured test executors and database executors). The test trigger also defines the path and name of the test log file in XML format (but the path itself is created by the test executor).</a:t>
+            </a:r>
+          </a:p>
+          <a:p>
+            <a:pPr lvl="1" fontAlgn="auto">
+              <a:spcBef>
+                <a:spcPts val="500"/>
+              </a:spcBef>
+              <a:spcAft>
+                <a:spcPts val="0"/>
+              </a:spcAft>
+            </a:pPr>
+            <a:r>
+              <a:rPr lang="de-DE" sz="1200" kern="0">
+                <a:solidFill>
+                  <a:srgbClr val="000000"/>
+                </a:solidFill>
+              </a:rPr>
+              <a:t>The test trigger needs to know:</a:t>
+            </a:r>
+          </a:p>
+          <a:p>
+            <a:pPr marL="582587" lvl="1" indent="-171450" fontAlgn="auto">
+              <a:spcBef>
+                <a:spcPts val="500"/>
+              </a:spcBef>
+              <a:spcAft>
+                <a:spcPts val="0"/>
+              </a:spcAft>
+              <a:buFont typeface="Arial" panose="020B0604020202020204" pitchFamily="34" charset="0"/>
+              <a:buChar char="•"/>
+            </a:pPr>
+            <a:r>
+              <a:rPr lang="de-DE" sz="1200" kern="0">
+                <a:solidFill>
+                  <a:srgbClr val="000000"/>
+                </a:solidFill>
+              </a:rPr>
+              <a:t>The command line of every test executor</a:t>
+            </a:r>
+          </a:p>
+          <a:p>
+            <a:pPr marL="582587" lvl="1" indent="-171450" fontAlgn="auto">
+              <a:spcBef>
+                <a:spcPts val="500"/>
+              </a:spcBef>
+              <a:spcAft>
+                <a:spcPts val="0"/>
+              </a:spcAft>
+              <a:buFont typeface="Arial" panose="020B0604020202020204" pitchFamily="34" charset="0"/>
+              <a:buChar char="•"/>
+            </a:pPr>
+            <a:r>
+              <a:rPr lang="de-DE" sz="1200" kern="0">
+                <a:solidFill>
+                  <a:srgbClr val="000000"/>
+                </a:solidFill>
+              </a:rPr>
+              <a:t>The command line of every database executor</a:t>
+            </a:r>
+          </a:p>
+          <a:p>
+            <a:pPr lvl="1" fontAlgn="auto">
+              <a:spcBef>
+                <a:spcPts val="500"/>
+              </a:spcBef>
+              <a:spcAft>
+                <a:spcPts val="0"/>
+              </a:spcAft>
+            </a:pPr>
+            <a:r>
+              <a:rPr lang="de-DE" sz="1200" kern="0">
+                <a:solidFill>
+                  <a:srgbClr val="000000"/>
+                </a:solidFill>
+              </a:rPr>
+              <a:t>But he does not know anything about the test execution itself. For the test execution the test executor is responsible.</a:t>
+            </a:r>
+          </a:p>
+          <a:p>
+            <a:pPr lvl="1" fontAlgn="auto">
+              <a:spcBef>
+                <a:spcPts val="500"/>
+              </a:spcBef>
+              <a:spcAft>
+                <a:spcPts val="0"/>
+              </a:spcAft>
+            </a:pPr>
+            <a:endParaRPr lang="de-DE" sz="1200" kern="0">
+              <a:solidFill>
+                <a:srgbClr val="000000"/>
+              </a:solidFill>
+            </a:endParaRPr>
+          </a:p>
+          <a:p>
             <a:pPr marL="171450" marR="0" indent="-171450" defTabSz="914400" eaLnBrk="1" fontAlgn="auto" latinLnBrk="0" hangingPunct="1">
               <a:spcBef>
                 <a:spcPts val="500"/>
@@ -19748,46 +21676,30 @@
                   <a:srgbClr val="000000"/>
                 </a:solidFill>
               </a:rPr>
-              <a:t>test trigger</a:t>
-            </a:r>
-            <a:r>
-              <a:rPr lang="de-DE" sz="1200" kern="0">
-                <a:solidFill>
-                  <a:srgbClr val="000000"/>
-                </a:solidFill>
-              </a:rPr>
-              <a:t>: Main entry point in the test execution; located within the build repository; manages the execution of all test related applications in all configured local repositories and therefore triggers the complete test</a:t>
-            </a:r>
-          </a:p>
-          <a:p>
-            <a:pPr marL="171450" marR="0" indent="-171450" defTabSz="914400" eaLnBrk="1" fontAlgn="auto" latinLnBrk="0" hangingPunct="1">
+              <a:t>test executor</a:t>
+            </a:r>
+            <a:endParaRPr lang="de-DE" sz="1200" kern="0">
+              <a:solidFill>
+                <a:srgbClr val="000000"/>
+              </a:solidFill>
+            </a:endParaRPr>
+          </a:p>
+          <a:p>
+            <a:pPr lvl="1" fontAlgn="auto">
               <a:spcBef>
                 <a:spcPts val="500"/>
               </a:spcBef>
               <a:spcAft>
                 <a:spcPts val="0"/>
               </a:spcAft>
-              <a:buClrTx/>
-              <a:buSzTx/>
-              <a:buFont typeface="Arial" panose="020B0604020202020204" pitchFamily="34" charset="0"/>
-              <a:buChar char="•"/>
-              <a:tabLst/>
             </a:pPr>
-            <a:r>
-              <a:rPr lang="de-DE" sz="1200" b="1" kern="0">
-                <a:solidFill>
-                  <a:srgbClr val="000000"/>
-                </a:solidFill>
-              </a:rPr>
-              <a:t>test executor</a:t>
-            </a:r>
             <a:r>
               <a:rPr lang="de-DE" sz="1200" kern="0">
                 <a:solidFill>
                   <a:srgbClr val="000000"/>
                 </a:solidFill>
               </a:rPr>
-              <a:t>: Executes all tests within a single repository; is located within this repository; the test executor can be:</a:t>
+              <a:t>Executes (recursively) all tests within a test folder; is located within this test folder (the test executor is where the tests are); a test can be:</a:t>
             </a:r>
           </a:p>
           <a:p>
@@ -19807,7 +21719,7 @@
                   <a:srgbClr val="000000"/>
                 </a:solidFill>
               </a:rPr>
-              <a:t>a Robot Framework AIO test suite executing all test robot files within the repository</a:t>
+              <a:t>a Robot Framework AIO test suite executing all test robot files within the test folder,</a:t>
             </a:r>
           </a:p>
           <a:p>
@@ -19827,7 +21739,7 @@
                   <a:srgbClr val="000000"/>
                 </a:solidFill>
               </a:rPr>
-              <a:t>a Python file executing all pytests within the repository</a:t>
+              <a:t>a Python pytest call executing all pytests within the test folder</a:t>
             </a:r>
           </a:p>
           <a:p>
@@ -19845,151 +21757,35 @@
                   <a:srgbClr val="000000"/>
                 </a:solidFill>
               </a:rPr>
-              <a:t>A test executor needs to have the ability do define the position of the test results (report folder). This is because of the test trigger needs to know where to find them. The test trigger defines the position of the report folder and tells the test executor this position in command line</a:t>
-            </a:r>
-          </a:p>
-          <a:p>
-            <a:pPr marL="171450" indent="-171450" fontAlgn="auto">
+              <a:t>The test executor is responsible for creating the full output path for the logfiles and reports. This information is defined by the test trigger and handed over to the test executor in command line. Later the same information is handed over to the database executor.</a:t>
+            </a:r>
+          </a:p>
+          <a:p>
+            <a:pPr lvl="1" fontAlgn="auto">
               <a:spcBef>
                 <a:spcPts val="500"/>
               </a:spcBef>
               <a:spcAft>
                 <a:spcPts val="0"/>
               </a:spcAft>
-              <a:buFont typeface="Arial" panose="020B0604020202020204" pitchFamily="34" charset="0"/>
-              <a:buChar char="•"/>
             </a:pPr>
-            <a:r>
-              <a:rPr lang="de-DE" sz="1200" b="1" kern="0">
-                <a:solidFill>
-                  <a:srgbClr val="000000"/>
-                </a:solidFill>
-              </a:rPr>
-              <a:t>database executor</a:t>
-            </a:r>
             <a:r>
               <a:rPr lang="de-DE" sz="1200" kern="0">
                 <a:solidFill>
                   <a:srgbClr val="000000"/>
                 </a:solidFill>
               </a:rPr>
-              <a:t>: Reads the test results and writes the results to the database; for several types of test results (robot, pytest, …) several different database executors are used</a:t>
-            </a:r>
-          </a:p>
-          <a:p>
-            <a:pPr marL="171450" indent="-171450" fontAlgn="auto">
+              <a:t>A test executor is able to run standalone – without any further information. Therefore the test executor knows about all details required for test execution – that is the command line of the involved test framework. In case of a log file is not provided by the test trigger in command line, the test executor defines a default path and name of the log file.</a:t>
+            </a:r>
+          </a:p>
+          <a:p>
+            <a:pPr lvl="1" fontAlgn="auto">
               <a:spcBef>
                 <a:spcPts val="500"/>
               </a:spcBef>
               <a:spcAft>
                 <a:spcPts val="0"/>
               </a:spcAft>
-              <a:buFont typeface="Arial" panose="020B0604020202020204" pitchFamily="34" charset="0"/>
-              <a:buChar char="•"/>
-            </a:pPr>
-            <a:endParaRPr lang="de-DE" sz="1200" kern="0">
-              <a:solidFill>
-                <a:srgbClr val="000000"/>
-              </a:solidFill>
-            </a:endParaRPr>
-          </a:p>
-          <a:p>
-            <a:pPr marL="171450" indent="-171450" fontAlgn="auto">
-              <a:spcBef>
-                <a:spcPts val="500"/>
-              </a:spcBef>
-              <a:spcAft>
-                <a:spcPts val="0"/>
-              </a:spcAft>
-              <a:buFont typeface="Arial" panose="020B0604020202020204" pitchFamily="34" charset="0"/>
-              <a:buChar char="•"/>
-            </a:pPr>
-            <a:r>
-              <a:rPr lang="de-DE" sz="1200" b="1" kern="0">
-                <a:solidFill>
-                  <a:srgbClr val="000000"/>
-                </a:solidFill>
-              </a:rPr>
-              <a:t>robot format / robot.xml</a:t>
-            </a:r>
-            <a:r>
-              <a:rPr lang="de-DE" sz="1200" kern="0">
-                <a:solidFill>
-                  <a:srgbClr val="000000"/>
-                </a:solidFill>
-              </a:rPr>
-              <a:t>: Format of the XML file in which the Robot Framework writes the test results</a:t>
-            </a:r>
-          </a:p>
-          <a:p>
-            <a:pPr marL="171450" indent="-171450" fontAlgn="auto">
-              <a:spcBef>
-                <a:spcPts val="500"/>
-              </a:spcBef>
-              <a:spcAft>
-                <a:spcPts val="0"/>
-              </a:spcAft>
-              <a:buFont typeface="Arial" panose="020B0604020202020204" pitchFamily="34" charset="0"/>
-              <a:buChar char="•"/>
-            </a:pPr>
-            <a:r>
-              <a:rPr lang="de-DE" sz="1200" b="1" kern="0">
-                <a:solidFill>
-                  <a:srgbClr val="000000"/>
-                </a:solidFill>
-              </a:rPr>
-              <a:t>pytest format / pytest.xml</a:t>
-            </a:r>
-            <a:r>
-              <a:rPr lang="de-DE" sz="1200" kern="0">
-                <a:solidFill>
-                  <a:srgbClr val="000000"/>
-                </a:solidFill>
-              </a:rPr>
-              <a:t>: Format of the XML file in which the Python pytest module writes the test results</a:t>
-            </a:r>
-          </a:p>
-          <a:p>
-            <a:pPr marL="171450" indent="-171450" fontAlgn="auto">
-              <a:spcBef>
-                <a:spcPts val="500"/>
-              </a:spcBef>
-              <a:spcAft>
-                <a:spcPts val="0"/>
-              </a:spcAft>
-              <a:buFont typeface="Arial" panose="020B0604020202020204" pitchFamily="34" charset="0"/>
-              <a:buChar char="•"/>
-            </a:pPr>
-            <a:r>
-              <a:rPr lang="de-DE" sz="1200" b="1" kern="0">
-                <a:solidFill>
-                  <a:srgbClr val="000000"/>
-                </a:solidFill>
-              </a:rPr>
-              <a:t>X-format</a:t>
-            </a:r>
-            <a:r>
-              <a:rPr lang="de-DE" sz="1200" kern="0">
-                <a:solidFill>
-                  <a:srgbClr val="000000"/>
-                </a:solidFill>
-              </a:rPr>
-              <a:t>: Generic term for a (currently unspecified) format of test results, that does not fit to the robot format and also not to the pytest format; currently theory only</a:t>
-            </a:r>
-          </a:p>
-          <a:p>
-            <a:pPr marL="171450" marR="0" indent="-171450" defTabSz="914400" eaLnBrk="1" fontAlgn="auto" latinLnBrk="0" hangingPunct="1">
-              <a:spcBef>
-                <a:spcPts val="500"/>
-              </a:spcBef>
-              <a:spcAft>
-                <a:spcPts val="0"/>
-              </a:spcAft>
-              <a:buClrTx/>
-              <a:buSzTx/>
-              <a:buFont typeface="Arial" panose="020B0604020202020204" pitchFamily="34" charset="0"/>
-              <a:buChar char="•"/>
-              <a:tabLst/>
             </a:pPr>
             <a:endParaRPr lang="de-DE" sz="1200" kern="0">
               <a:solidFill>
@@ -20092,7 +21888,7 @@
           <a:p>
             <a:r>
               <a:rPr lang="de-DE"/>
-              <a:t>Test configuration and execution</a:t>
+              <a:t>Terms and predefinitions (2/2)</a:t>
             </a:r>
             <a:endParaRPr lang="en-US"/>
           </a:p>
@@ -20150,6 +21946,49 @@
           </a:bodyPr>
           <a:lstStyle/>
           <a:p>
+            <a:pPr marL="171450" indent="-171450" fontAlgn="auto">
+              <a:spcBef>
+                <a:spcPts val="500"/>
+              </a:spcBef>
+              <a:spcAft>
+                <a:spcPts val="0"/>
+              </a:spcAft>
+              <a:buFont typeface="Arial" panose="020B0604020202020204" pitchFamily="34" charset="0"/>
+              <a:buChar char="•"/>
+            </a:pPr>
+            <a:r>
+              <a:rPr lang="de-DE" sz="1200" b="1" kern="0">
+                <a:solidFill>
+                  <a:srgbClr val="000000"/>
+                </a:solidFill>
+              </a:rPr>
+              <a:t>database executor</a:t>
+            </a:r>
+            <a:endParaRPr lang="de-DE" sz="1200" kern="0">
+              <a:solidFill>
+                <a:srgbClr val="000000"/>
+              </a:solidFill>
+            </a:endParaRPr>
+          </a:p>
+          <a:p>
+            <a:pPr lvl="1" fontAlgn="auto">
+              <a:spcBef>
+                <a:spcPts val="500"/>
+              </a:spcBef>
+              <a:spcAft>
+                <a:spcPts val="0"/>
+              </a:spcAft>
+            </a:pPr>
+            <a:r>
+              <a:rPr lang="de-DE" sz="1200" kern="0">
+                <a:solidFill>
+                  <a:srgbClr val="000000"/>
+                </a:solidFill>
+              </a:rPr>
+              <a:t>Reads the test results out of the log files and writes the results to the database; for several types of test results (robot, pytest, …) several different database executors are available. The database executor is called by the test trigger.</a:t>
+            </a:r>
+          </a:p>
+          <a:p>
             <a:pPr fontAlgn="auto">
               <a:spcBef>
                 <a:spcPts val="500"/>
@@ -20158,14 +21997,188 @@
                 <a:spcPts val="0"/>
               </a:spcAft>
             </a:pPr>
+            <a:endParaRPr lang="de-DE" sz="1200" kern="0">
+              <a:solidFill>
+                <a:srgbClr val="000000"/>
+              </a:solidFill>
+            </a:endParaRPr>
+          </a:p>
+          <a:p>
+            <a:pPr marL="171450" indent="-171450" fontAlgn="auto">
+              <a:spcBef>
+                <a:spcPts val="500"/>
+              </a:spcBef>
+              <a:spcAft>
+                <a:spcPts val="0"/>
+              </a:spcAft>
+              <a:buFont typeface="Arial" panose="020B0604020202020204" pitchFamily="34" charset="0"/>
+              <a:buChar char="•"/>
+            </a:pPr>
             <a:r>
               <a:rPr lang="de-DE" sz="1200" b="1" kern="0">
                 <a:solidFill>
                   <a:srgbClr val="000000"/>
                 </a:solidFill>
               </a:rPr>
-              <a:t>The test configuration needs to define the following things:</a:t>
-            </a:r>
+              <a:t>test folder</a:t>
+            </a:r>
+          </a:p>
+          <a:p>
+            <a:pPr lvl="1" fontAlgn="auto">
+              <a:spcBef>
+                <a:spcPts val="500"/>
+              </a:spcBef>
+              <a:spcAft>
+                <a:spcPts val="0"/>
+              </a:spcAft>
+            </a:pPr>
+            <a:r>
+              <a:rPr lang="de-DE" sz="1200" kern="0">
+                <a:solidFill>
+                  <a:srgbClr val="000000"/>
+                </a:solidFill>
+              </a:rPr>
+              <a:t>A test folder is a folder that contains test files of a certain type (flat or also in subfolders). The currently supported test types are the robot format and the pytest format. Every test folder contains exactly one single test executor that is related to the type of tests within this folder. Tests of different types must not be intermixed within one test folder. In case of a repository contains both, robot tests and pytests, then this repository needs to have two different test folders for them.</a:t>
+            </a:r>
+          </a:p>
+          <a:p>
+            <a:pPr fontAlgn="auto">
+              <a:spcBef>
+                <a:spcPts val="500"/>
+              </a:spcBef>
+              <a:spcAft>
+                <a:spcPts val="0"/>
+              </a:spcAft>
+            </a:pPr>
+            <a:endParaRPr lang="de-DE" sz="1200" kern="0">
+              <a:solidFill>
+                <a:srgbClr val="000000"/>
+              </a:solidFill>
+            </a:endParaRPr>
+          </a:p>
+          <a:p>
+            <a:pPr marL="171450" indent="-171450" fontAlgn="auto">
+              <a:spcBef>
+                <a:spcPts val="500"/>
+              </a:spcBef>
+              <a:spcAft>
+                <a:spcPts val="0"/>
+              </a:spcAft>
+              <a:buFont typeface="Arial" panose="020B0604020202020204" pitchFamily="34" charset="0"/>
+              <a:buChar char="•"/>
+            </a:pPr>
+            <a:r>
+              <a:rPr lang="de-DE" sz="1200" b="1" kern="0">
+                <a:solidFill>
+                  <a:srgbClr val="000000"/>
+                </a:solidFill>
+              </a:rPr>
+              <a:t>test types</a:t>
+            </a:r>
+          </a:p>
+          <a:p>
+            <a:pPr marL="582587" lvl="1" indent="-171450" fontAlgn="auto">
+              <a:spcBef>
+                <a:spcPts val="500"/>
+              </a:spcBef>
+              <a:spcAft>
+                <a:spcPts val="0"/>
+              </a:spcAft>
+              <a:buFont typeface="Arial" panose="020B0604020202020204" pitchFamily="34" charset="0"/>
+              <a:buChar char="•"/>
+            </a:pPr>
+            <a:r>
+              <a:rPr lang="de-DE" sz="1200" b="1" kern="0">
+                <a:solidFill>
+                  <a:srgbClr val="000000"/>
+                </a:solidFill>
+              </a:rPr>
+              <a:t>robot format / ROBOT / robot.xml</a:t>
+            </a:r>
+            <a:r>
+              <a:rPr lang="de-DE" sz="1200" kern="0">
+                <a:solidFill>
+                  <a:srgbClr val="000000"/>
+                </a:solidFill>
+              </a:rPr>
+              <a:t>: Format of the XML file in which the Robot Framework writes the test results</a:t>
+            </a:r>
+          </a:p>
+          <a:p>
+            <a:pPr marL="582587" lvl="1" indent="-171450" fontAlgn="auto">
+              <a:spcBef>
+                <a:spcPts val="500"/>
+              </a:spcBef>
+              <a:spcAft>
+                <a:spcPts val="0"/>
+              </a:spcAft>
+              <a:buFont typeface="Arial" panose="020B0604020202020204" pitchFamily="34" charset="0"/>
+              <a:buChar char="•"/>
+            </a:pPr>
+            <a:r>
+              <a:rPr lang="de-DE" sz="1200" b="1" kern="0">
+                <a:solidFill>
+                  <a:srgbClr val="000000"/>
+                </a:solidFill>
+              </a:rPr>
+              <a:t>pytest format / PYTEST / pytest.xml</a:t>
+            </a:r>
+            <a:r>
+              <a:rPr lang="de-DE" sz="1200" kern="0">
+                <a:solidFill>
+                  <a:srgbClr val="000000"/>
+                </a:solidFill>
+              </a:rPr>
+              <a:t>: Format of the XML file in which the Python pytest module writes the test results</a:t>
+            </a:r>
+          </a:p>
+          <a:p>
+            <a:pPr marL="582587" lvl="1" indent="-171450" fontAlgn="auto">
+              <a:spcBef>
+                <a:spcPts val="500"/>
+              </a:spcBef>
+              <a:spcAft>
+                <a:spcPts val="0"/>
+              </a:spcAft>
+              <a:buFont typeface="Arial" panose="020B0604020202020204" pitchFamily="34" charset="0"/>
+              <a:buChar char="•"/>
+            </a:pPr>
+            <a:r>
+              <a:rPr lang="de-DE" sz="1200" b="1" kern="0">
+                <a:solidFill>
+                  <a:srgbClr val="000000"/>
+                </a:solidFill>
+              </a:rPr>
+              <a:t>X-format</a:t>
+            </a:r>
+            <a:r>
+              <a:rPr lang="de-DE" sz="1200" kern="0">
+                <a:solidFill>
+                  <a:srgbClr val="000000"/>
+                </a:solidFill>
+              </a:rPr>
+              <a:t>: Generic term for a (currently unspecified) format of test results, that does not fit to the robot format and also not to the pytest format; currently theory only</a:t>
+            </a:r>
+          </a:p>
+          <a:p>
+            <a:pPr marL="171450" marR="0" indent="-171450" defTabSz="914400" eaLnBrk="1" fontAlgn="auto" latinLnBrk="0" hangingPunct="1">
+              <a:spcBef>
+                <a:spcPts val="500"/>
+              </a:spcBef>
+              <a:spcAft>
+                <a:spcPts val="0"/>
+              </a:spcAft>
+              <a:buClrTx/>
+              <a:buSzTx/>
+              <a:buFont typeface="Arial" panose="020B0604020202020204" pitchFamily="34" charset="0"/>
+              <a:buChar char="•"/>
+              <a:tabLst/>
+            </a:pPr>
+            <a:endParaRPr lang="de-DE" sz="1200" kern="0">
+              <a:solidFill>
+                <a:srgbClr val="000000"/>
+              </a:solidFill>
+            </a:endParaRPr>
           </a:p>
           <a:p>
             <a:pPr marR="0" defTabSz="914400" eaLnBrk="1" fontAlgn="auto" latinLnBrk="0" hangingPunct="1">
@@ -20186,352 +22199,6 @@
                 <a:srgbClr val="000000"/>
               </a:solidFill>
             </a:endParaRPr>
-          </a:p>
-          <a:p>
-            <a:pPr marL="171450" marR="0" indent="-171450" defTabSz="914400" eaLnBrk="1" fontAlgn="auto" latinLnBrk="0" hangingPunct="1">
-              <a:spcBef>
-                <a:spcPts val="500"/>
-              </a:spcBef>
-              <a:spcAft>
-                <a:spcPts val="0"/>
-              </a:spcAft>
-              <a:buClrTx/>
-              <a:buSzTx/>
-              <a:buFont typeface="Arial" panose="020B0604020202020204" pitchFamily="34" charset="0"/>
-              <a:buChar char="•"/>
-              <a:tabLst/>
-            </a:pPr>
-            <a:r>
-              <a:rPr lang="de-DE" sz="1200" kern="0">
-                <a:solidFill>
-                  <a:srgbClr val="000000"/>
-                </a:solidFill>
-              </a:rPr>
-              <a:t>Which repositories to consider (in case of the repository contains tests that shall be executed)</a:t>
-            </a:r>
-          </a:p>
-          <a:p>
-            <a:pPr marL="171450" marR="0" indent="-171450" defTabSz="914400" eaLnBrk="1" fontAlgn="auto" latinLnBrk="0" hangingPunct="1">
-              <a:spcBef>
-                <a:spcPts val="500"/>
-              </a:spcBef>
-              <a:spcAft>
-                <a:spcPts val="0"/>
-              </a:spcAft>
-              <a:buClrTx/>
-              <a:buSzTx/>
-              <a:buFont typeface="Arial" panose="020B0604020202020204" pitchFamily="34" charset="0"/>
-              <a:buChar char="•"/>
-              <a:tabLst/>
-            </a:pPr>
-            <a:r>
-              <a:rPr lang="de-DE" sz="1200" kern="0">
-                <a:solidFill>
-                  <a:srgbClr val="000000"/>
-                </a:solidFill>
-              </a:rPr>
-              <a:t>Position of test folders within a repository (repository and test folder should be handled separately because one repository may contain more than one test folder, maybe because there are completely different types of tests inside)</a:t>
-            </a:r>
-          </a:p>
-          <a:p>
-            <a:pPr marL="171450" marR="0" indent="-171450" defTabSz="914400" eaLnBrk="1" fontAlgn="auto" latinLnBrk="0" hangingPunct="1">
-              <a:spcBef>
-                <a:spcPts val="500"/>
-              </a:spcBef>
-              <a:spcAft>
-                <a:spcPts val="0"/>
-              </a:spcAft>
-              <a:buClrTx/>
-              <a:buSzTx/>
-              <a:buFont typeface="Arial" panose="020B0604020202020204" pitchFamily="34" charset="0"/>
-              <a:buChar char="•"/>
-              <a:tabLst/>
-            </a:pPr>
-            <a:r>
-              <a:rPr lang="de-DE" sz="1200" kern="0">
-                <a:solidFill>
-                  <a:srgbClr val="000000"/>
-                </a:solidFill>
-              </a:rPr>
-              <a:t>Type of the test within the test folder (robot, pytest, …)</a:t>
-            </a:r>
-          </a:p>
-          <a:p>
-            <a:pPr marL="171450" marR="0" indent="-171450" defTabSz="914400" eaLnBrk="1" fontAlgn="auto" latinLnBrk="0" hangingPunct="1">
-              <a:spcBef>
-                <a:spcPts val="500"/>
-              </a:spcBef>
-              <a:spcAft>
-                <a:spcPts val="0"/>
-              </a:spcAft>
-              <a:buClrTx/>
-              <a:buSzTx/>
-              <a:buFont typeface="Arial" panose="020B0604020202020204" pitchFamily="34" charset="0"/>
-              <a:buChar char="•"/>
-              <a:tabLst/>
-            </a:pPr>
-            <a:r>
-              <a:rPr lang="de-DE" sz="1200" kern="0">
-                <a:solidFill>
-                  <a:srgbClr val="000000"/>
-                </a:solidFill>
-              </a:rPr>
-              <a:t>Position and name of the test executor within the test folder</a:t>
-            </a:r>
-          </a:p>
-          <a:p>
-            <a:pPr marL="171450" marR="0" indent="-171450" defTabSz="914400" eaLnBrk="1" fontAlgn="auto" latinLnBrk="0" hangingPunct="1">
-              <a:spcBef>
-                <a:spcPts val="500"/>
-              </a:spcBef>
-              <a:spcAft>
-                <a:spcPts val="0"/>
-              </a:spcAft>
-              <a:buClrTx/>
-              <a:buSzTx/>
-              <a:buFont typeface="Arial" panose="020B0604020202020204" pitchFamily="34" charset="0"/>
-              <a:buChar char="•"/>
-              <a:tabLst/>
-            </a:pPr>
-            <a:r>
-              <a:rPr lang="de-DE" sz="1200" kern="0">
-                <a:solidFill>
-                  <a:srgbClr val="000000"/>
-                </a:solidFill>
-              </a:rPr>
-              <a:t>Where to let the test executor save the test results</a:t>
-            </a:r>
-          </a:p>
-          <a:p>
-            <a:pPr marL="171450" marR="0" indent="-171450" defTabSz="914400" eaLnBrk="1" fontAlgn="auto" latinLnBrk="0" hangingPunct="1">
-              <a:spcBef>
-                <a:spcPts val="500"/>
-              </a:spcBef>
-              <a:spcAft>
-                <a:spcPts val="0"/>
-              </a:spcAft>
-              <a:buClrTx/>
-              <a:buSzTx/>
-              <a:buFont typeface="Arial" panose="020B0604020202020204" pitchFamily="34" charset="0"/>
-              <a:buChar char="•"/>
-              <a:tabLst/>
-            </a:pPr>
-            <a:r>
-              <a:rPr lang="de-DE" sz="1200" kern="0">
-                <a:solidFill>
-                  <a:srgbClr val="000000"/>
-                </a:solidFill>
-              </a:rPr>
-              <a:t>Which database executor is required to write the test results to database</a:t>
-            </a:r>
-          </a:p>
-          <a:p>
-            <a:pPr marL="171450" marR="0" indent="-171450" defTabSz="914400" eaLnBrk="1" fontAlgn="auto" latinLnBrk="0" hangingPunct="1">
-              <a:spcBef>
-                <a:spcPts val="500"/>
-              </a:spcBef>
-              <a:spcAft>
-                <a:spcPts val="0"/>
-              </a:spcAft>
-              <a:buClrTx/>
-              <a:buSzTx/>
-              <a:buFont typeface="Arial" panose="020B0604020202020204" pitchFamily="34" charset="0"/>
-              <a:buChar char="•"/>
-              <a:tabLst/>
-            </a:pPr>
-            <a:r>
-              <a:rPr lang="de-DE" sz="1200" kern="0">
-                <a:solidFill>
-                  <a:srgbClr val="000000"/>
-                </a:solidFill>
-              </a:rPr>
-              <a:t>Which additional json configuration file is required in command line of database executor (</a:t>
-            </a:r>
-            <a:r>
-              <a:rPr lang="de-DE" sz="1200" i="1" kern="0">
-                <a:solidFill>
-                  <a:srgbClr val="C00000"/>
-                </a:solidFill>
-              </a:rPr>
-              <a:t>to be clarified: test type specific or one single file for all?</a:t>
-            </a:r>
-            <a:r>
-              <a:rPr lang="de-DE" sz="1200" kern="0">
-                <a:solidFill>
-                  <a:srgbClr val="000000"/>
-                </a:solidFill>
-              </a:rPr>
-              <a:t>)</a:t>
-            </a:r>
-          </a:p>
-          <a:p>
-            <a:pPr marL="171450" marR="0" indent="-171450" defTabSz="914400" eaLnBrk="1" fontAlgn="auto" latinLnBrk="0" hangingPunct="1">
-              <a:spcBef>
-                <a:spcPts val="500"/>
-              </a:spcBef>
-              <a:spcAft>
-                <a:spcPts val="0"/>
-              </a:spcAft>
-              <a:buClrTx/>
-              <a:buSzTx/>
-              <a:buFont typeface="Arial" panose="020B0604020202020204" pitchFamily="34" charset="0"/>
-              <a:buChar char="•"/>
-              <a:tabLst/>
-            </a:pPr>
-            <a:endParaRPr lang="de-DE" sz="1200" kern="0">
-              <a:solidFill>
-                <a:srgbClr val="000000"/>
-              </a:solidFill>
-            </a:endParaRPr>
-          </a:p>
-          <a:p>
-            <a:pPr marR="0" defTabSz="914400" eaLnBrk="1" fontAlgn="auto" latinLnBrk="0" hangingPunct="1">
-              <a:spcBef>
-                <a:spcPts val="500"/>
-              </a:spcBef>
-              <a:spcAft>
-                <a:spcPts val="0"/>
-              </a:spcAft>
-              <a:buClrTx/>
-              <a:buSzTx/>
-              <a:buFontTx/>
-              <a:buNone/>
-              <a:tabLst/>
-            </a:pPr>
-            <a:endParaRPr lang="de-DE" sz="1200" kern="0">
-              <a:solidFill>
-                <a:srgbClr val="000000"/>
-              </a:solidFill>
-            </a:endParaRPr>
-          </a:p>
-          <a:p>
-            <a:pPr marR="0" defTabSz="914400" eaLnBrk="1" fontAlgn="auto" latinLnBrk="0" hangingPunct="1">
-              <a:spcBef>
-                <a:spcPts val="500"/>
-              </a:spcBef>
-              <a:spcAft>
-                <a:spcPts val="0"/>
-              </a:spcAft>
-              <a:buClrTx/>
-              <a:buSzTx/>
-              <a:buFontTx/>
-              <a:buNone/>
-              <a:tabLst/>
-            </a:pPr>
-            <a:endParaRPr lang="de-DE" sz="1200" kern="0">
-              <a:solidFill>
-                <a:srgbClr val="000000"/>
-              </a:solidFill>
-            </a:endParaRPr>
-          </a:p>
-          <a:p>
-            <a:pPr marR="0" defTabSz="914400" eaLnBrk="1" fontAlgn="auto" latinLnBrk="0" hangingPunct="1">
-              <a:spcBef>
-                <a:spcPts val="500"/>
-              </a:spcBef>
-              <a:spcAft>
-                <a:spcPts val="0"/>
-              </a:spcAft>
-              <a:buClrTx/>
-              <a:buSzTx/>
-              <a:buFontTx/>
-              <a:buNone/>
-              <a:tabLst/>
-            </a:pPr>
-            <a:endParaRPr lang="de-DE" sz="1200" kern="0">
-              <a:solidFill>
-                <a:srgbClr val="000000"/>
-              </a:solidFill>
-            </a:endParaRPr>
-          </a:p>
-          <a:p>
-            <a:pPr marR="0" defTabSz="914400" eaLnBrk="1" fontAlgn="auto" latinLnBrk="0" hangingPunct="1">
-              <a:spcBef>
-                <a:spcPts val="500"/>
-              </a:spcBef>
-              <a:spcAft>
-                <a:spcPts val="0"/>
-              </a:spcAft>
-              <a:buClrTx/>
-              <a:buSzTx/>
-              <a:buFontTx/>
-              <a:buNone/>
-              <a:tabLst/>
-            </a:pPr>
-            <a:endParaRPr lang="de-DE" sz="1200" kern="0">
-              <a:solidFill>
-                <a:srgbClr val="000000"/>
-              </a:solidFill>
-            </a:endParaRPr>
-          </a:p>
-          <a:p>
-            <a:pPr marR="0" defTabSz="914400" eaLnBrk="1" fontAlgn="auto" latinLnBrk="0" hangingPunct="1">
-              <a:spcBef>
-                <a:spcPts val="500"/>
-              </a:spcBef>
-              <a:spcAft>
-                <a:spcPts val="0"/>
-              </a:spcAft>
-              <a:buClrTx/>
-              <a:buSzTx/>
-              <a:buFontTx/>
-              <a:buNone/>
-              <a:tabLst/>
-            </a:pPr>
-            <a:r>
-              <a:rPr lang="de-DE" sz="1200" b="1" kern="0">
-                <a:solidFill>
-                  <a:srgbClr val="000000"/>
-                </a:solidFill>
-              </a:rPr>
-              <a:t>The test trigger needs to know:</a:t>
-            </a:r>
-          </a:p>
-          <a:p>
-            <a:pPr marL="171450" marR="0" indent="-171450" defTabSz="914400" eaLnBrk="1" fontAlgn="auto" latinLnBrk="0" hangingPunct="1">
-              <a:spcBef>
-                <a:spcPts val="500"/>
-              </a:spcBef>
-              <a:spcAft>
-                <a:spcPts val="0"/>
-              </a:spcAft>
-              <a:buClrTx/>
-              <a:buSzTx/>
-              <a:buFont typeface="Arial" panose="020B0604020202020204" pitchFamily="34" charset="0"/>
-              <a:buChar char="•"/>
-              <a:tabLst/>
-            </a:pPr>
-            <a:r>
-              <a:rPr lang="de-DE" sz="1200" kern="0">
-                <a:solidFill>
-                  <a:srgbClr val="000000"/>
-                </a:solidFill>
-              </a:rPr>
-              <a:t>The command line of every test executor</a:t>
-            </a:r>
-          </a:p>
-          <a:p>
-            <a:pPr marL="171450" marR="0" indent="-171450" defTabSz="914400" eaLnBrk="1" fontAlgn="auto" latinLnBrk="0" hangingPunct="1">
-              <a:spcBef>
-                <a:spcPts val="500"/>
-              </a:spcBef>
-              <a:spcAft>
-                <a:spcPts val="0"/>
-              </a:spcAft>
-              <a:buClrTx/>
-              <a:buSzTx/>
-              <a:buFont typeface="Arial" panose="020B0604020202020204" pitchFamily="34" charset="0"/>
-              <a:buChar char="•"/>
-              <a:tabLst/>
-            </a:pPr>
-            <a:r>
-              <a:rPr lang="de-DE" sz="1200" kern="0">
-                <a:solidFill>
-                  <a:srgbClr val="000000"/>
-                </a:solidFill>
-              </a:rPr>
-              <a:t>The command line of every database executor</a:t>
-            </a:r>
           </a:p>
           <a:p>
             <a:pPr marR="0" defTabSz="914400" eaLnBrk="1" fontAlgn="auto" latinLnBrk="0" hangingPunct="1">
@@ -20564,7 +22231,7 @@
     </p:spTree>
     <p:extLst>
       <p:ext uri="{BB962C8B-B14F-4D97-AF65-F5344CB8AC3E}">
-        <p14:creationId xmlns:p14="http://schemas.microsoft.com/office/powerpoint/2010/main" val="3564699658"/>
+        <p14:creationId xmlns:p14="http://schemas.microsoft.com/office/powerpoint/2010/main" val="3042731940"/>
       </p:ext>
     </p:extLst>
   </p:cSld>
@@ -21095,7 +22762,63 @@
 </p:tagLst>
 </file>
 
+<file path=ppt/tags/tag76.xml><?xml version="1.0" encoding="utf-8"?>
+<p:tagLst xmlns:a="http://schemas.openxmlformats.org/drawingml/2006/main" xmlns:r="http://schemas.openxmlformats.org/officeDocument/2006/relationships" xmlns:p="http://schemas.openxmlformats.org/presentationml/2006/main">
+  <p:tag name="COLORSETCLASSNAME" val="ColorSet2"/>
+  <p:tag name="COLORS" val="-1;-1;-1;-1;-1;-2"/>
+</p:tagLst>
+</file>
+
+<file path=ppt/tags/tag77.xml><?xml version="1.0" encoding="utf-8"?>
+<p:tagLst xmlns:a="http://schemas.openxmlformats.org/drawingml/2006/main" xmlns:r="http://schemas.openxmlformats.org/officeDocument/2006/relationships" xmlns:p="http://schemas.openxmlformats.org/presentationml/2006/main">
+  <p:tag name="COLORSETCLASSNAME" val="ColorSet2"/>
+  <p:tag name="COLORS" val="-2;-2;-2;-2;-1;-2"/>
+</p:tagLst>
+</file>
+
+<file path=ppt/tags/tag78.xml><?xml version="1.0" encoding="utf-8"?>
+<p:tagLst xmlns:a="http://schemas.openxmlformats.org/drawingml/2006/main" xmlns:r="http://schemas.openxmlformats.org/officeDocument/2006/relationships" xmlns:p="http://schemas.openxmlformats.org/presentationml/2006/main">
+  <p:tag name="COLORSETCLASSNAME" val="ColorSet2"/>
+  <p:tag name="COLORS" val="-1;-1;-1;-1;-1;-2"/>
+</p:tagLst>
+</file>
+
+<file path=ppt/tags/tag79.xml><?xml version="1.0" encoding="utf-8"?>
+<p:tagLst xmlns:a="http://schemas.openxmlformats.org/drawingml/2006/main" xmlns:r="http://schemas.openxmlformats.org/officeDocument/2006/relationships" xmlns:p="http://schemas.openxmlformats.org/presentationml/2006/main">
+  <p:tag name="COLORSETCLASSNAME" val="ColorSet2"/>
+  <p:tag name="COLORS" val="-2;-2;-2;-2;-1;-2"/>
+</p:tagLst>
+</file>
+
 <file path=ppt/tags/tag8.xml><?xml version="1.0" encoding="utf-8"?>
+<p:tagLst xmlns:a="http://schemas.openxmlformats.org/drawingml/2006/main" xmlns:r="http://schemas.openxmlformats.org/officeDocument/2006/relationships" xmlns:p="http://schemas.openxmlformats.org/presentationml/2006/main">
+  <p:tag name="COLORSETCLASSNAME" val="ColorSet2"/>
+  <p:tag name="COLORS" val="-2;-2;-2;-2;-1;-2"/>
+</p:tagLst>
+</file>
+
+<file path=ppt/tags/tag80.xml><?xml version="1.0" encoding="utf-8"?>
+<p:tagLst xmlns:a="http://schemas.openxmlformats.org/drawingml/2006/main" xmlns:r="http://schemas.openxmlformats.org/officeDocument/2006/relationships" xmlns:p="http://schemas.openxmlformats.org/presentationml/2006/main">
+  <p:tag name="COLORSETCLASSNAME" val="ColorSet2"/>
+  <p:tag name="COLORS" val="-1;-1;-1;-1;-1;-2"/>
+</p:tagLst>
+</file>
+
+<file path=ppt/tags/tag81.xml><?xml version="1.0" encoding="utf-8"?>
+<p:tagLst xmlns:a="http://schemas.openxmlformats.org/drawingml/2006/main" xmlns:r="http://schemas.openxmlformats.org/officeDocument/2006/relationships" xmlns:p="http://schemas.openxmlformats.org/presentationml/2006/main">
+  <p:tag name="COLORSETCLASSNAME" val="ColorSet2"/>
+  <p:tag name="COLORS" val="-2;-2;-2;-2;-1;-2"/>
+</p:tagLst>
+</file>
+
+<file path=ppt/tags/tag82.xml><?xml version="1.0" encoding="utf-8"?>
+<p:tagLst xmlns:a="http://schemas.openxmlformats.org/drawingml/2006/main" xmlns:r="http://schemas.openxmlformats.org/officeDocument/2006/relationships" xmlns:p="http://schemas.openxmlformats.org/presentationml/2006/main">
+  <p:tag name="COLORSETCLASSNAME" val="ColorSet2"/>
+  <p:tag name="COLORS" val="-1;-1;-1;-1;-1;-2"/>
+</p:tagLst>
+</file>
+
+<file path=ppt/tags/tag83.xml><?xml version="1.0" encoding="utf-8"?>
 <p:tagLst xmlns:a="http://schemas.openxmlformats.org/drawingml/2006/main" xmlns:r="http://schemas.openxmlformats.org/officeDocument/2006/relationships" xmlns:p="http://schemas.openxmlformats.org/presentationml/2006/main">
   <p:tag name="COLORSETCLASSNAME" val="ColorSet2"/>
   <p:tag name="COLORS" val="-2;-2;-2;-2;-1;-2"/>

</xml_diff>

<commit_message>
Added possibility to provide parameters in command line; RFW-TestConcept adapted
</commit_message>
<xml_diff>
--- a/test/documentation/RFW-TestConcept.pptx
+++ b/test/documentation/RFW-TestConcept.pptx
@@ -271,7 +271,7 @@
           <a:p>
             <a:fld id="{6007911F-CEAF-4F0B-98BD-EFB38C6572AA}" type="datetimeFigureOut">
               <a:rPr lang="de-DE" smtClean="0"/>
-              <a:t>05.10.2022</a:t>
+              <a:t>17.10.2022</a:t>
             </a:fld>
             <a:endParaRPr lang="de-DE"/>
           </a:p>
@@ -8682,7 +8682,7 @@
                 <a:uFillTx/>
                 <a:latin typeface="Bosch Office Sans" pitchFamily="2" charset="0"/>
               </a:rPr>
-              <a:t> | Cross-Domain Computing Solutions | XC-CT/ECA3 | 2022-10-05</a:t>
+              <a:t> | Cross-Domain Computing Solutions | XC-CT/ECA3 | 2022-10-17</a:t>
             </a:r>
           </a:p>
         </p:txBody>
@@ -9483,13 +9483,48 @@
               </a:rPr>
               <a:t>either or; no merge</a:t>
             </a:r>
+            <a:endParaRPr lang="de-DE" sz="1200" kern="0">
+              <a:solidFill>
+                <a:srgbClr val="000000"/>
+              </a:solidFill>
+            </a:endParaRPr>
+          </a:p>
+          <a:p>
+            <a:pPr lvl="1" fontAlgn="auto">
+              <a:spcBef>
+                <a:spcPts val="500"/>
+              </a:spcBef>
+              <a:spcAft>
+                <a:spcPts val="0"/>
+              </a:spcAft>
+            </a:pPr>
             <a:r>
               <a:rPr lang="de-DE" sz="1200" kern="0">
                 <a:solidFill>
                   <a:srgbClr val="000000"/>
                 </a:solidFill>
+                <a:latin typeface="Courier New" panose="02070309020205020404" pitchFamily="49" charset="0"/>
+                <a:cs typeface="Courier New" panose="02070309020205020404" pitchFamily="49" charset="0"/>
               </a:rPr>
-              <a:t>.</a:t>
+              <a:t>--params</a:t>
+            </a:r>
+          </a:p>
+          <a:p>
+            <a:pPr lvl="1" fontAlgn="auto">
+              <a:spcBef>
+                <a:spcPts val="500"/>
+              </a:spcBef>
+              <a:spcAft>
+                <a:spcPts val="0"/>
+              </a:spcAft>
+            </a:pPr>
+            <a:r>
+              <a:rPr lang="de-DE" sz="1200" kern="0">
+                <a:solidFill>
+                  <a:srgbClr val="000000"/>
+                </a:solidFill>
+              </a:rPr>
+              <a:t>Parameter to be used in Test Trigger configuration file</a:t>
             </a:r>
           </a:p>
           <a:p>
@@ -9647,21 +9682,6 @@
                 <a:spcPts val="0"/>
               </a:spcAft>
             </a:pPr>
-            <a:endParaRPr lang="de-DE" sz="1200" kern="0">
-              <a:solidFill>
-                <a:srgbClr val="000000"/>
-              </a:solidFill>
-            </a:endParaRPr>
-          </a:p>
-          <a:p>
-            <a:pPr fontAlgn="auto">
-              <a:spcBef>
-                <a:spcPts val="500"/>
-              </a:spcBef>
-              <a:spcAft>
-                <a:spcPts val="0"/>
-              </a:spcAft>
-            </a:pPr>
             <a:r>
               <a:rPr lang="de-DE" sz="1200" kern="0">
                 <a:solidFill>
@@ -9670,7 +9690,7 @@
                 <a:latin typeface="Courier New" panose="02070309020205020404" pitchFamily="49" charset="0"/>
                 <a:cs typeface="Courier New" panose="02070309020205020404" pitchFamily="49" charset="0"/>
               </a:rPr>
-              <a:t>"%RobotPythonPath%/python.exe" ./aio-test-trigger.py --configfile "C:/RobotTest/testtrigger_config.json„</a:t>
+              <a:t>"%RobotPythonPath%/python.exe" ./aio-test-trigger.py --configfile "C:/RobotTest/testtrigger_config.json"</a:t>
             </a:r>
           </a:p>
           <a:p>
@@ -10092,6 +10112,54 @@
               </a:rPr>
               <a:t> must contain all required filter.</a:t>
             </a:r>
+          </a:p>
+          <a:p>
+            <a:pPr fontAlgn="auto">
+              <a:spcBef>
+                <a:spcPts val="500"/>
+              </a:spcBef>
+              <a:spcAft>
+                <a:spcPts val="0"/>
+              </a:spcAft>
+            </a:pPr>
+            <a:endParaRPr lang="de-DE" sz="1200" kern="0">
+              <a:solidFill>
+                <a:srgbClr val="000000"/>
+              </a:solidFill>
+            </a:endParaRPr>
+          </a:p>
+          <a:p>
+            <a:pPr fontAlgn="auto">
+              <a:spcBef>
+                <a:spcPts val="500"/>
+              </a:spcBef>
+              <a:spcAft>
+                <a:spcPts val="0"/>
+              </a:spcAft>
+            </a:pPr>
+            <a:r>
+              <a:rPr lang="de-DE" sz="1200" kern="0">
+                <a:solidFill>
+                  <a:srgbClr val="000000"/>
+                </a:solidFill>
+              </a:rPr>
+              <a:t>For the Database Executors only a local command line is supported (see section TESTTYPES in Test Trigger Configuration).</a:t>
+            </a:r>
+          </a:p>
+          <a:p>
+            <a:pPr fontAlgn="auto">
+              <a:spcBef>
+                <a:spcPts val="500"/>
+              </a:spcBef>
+              <a:spcAft>
+                <a:spcPts val="0"/>
+              </a:spcAft>
+            </a:pPr>
+            <a:endParaRPr lang="de-DE" sz="1200" kern="0">
+              <a:solidFill>
+                <a:srgbClr val="000000"/>
+              </a:solidFill>
+            </a:endParaRPr>
           </a:p>
           <a:p>
             <a:pPr fontAlgn="auto">
@@ -15891,7 +15959,7 @@
                   <a:srgbClr val="000000"/>
                 </a:solidFill>
               </a:rPr>
-              <a:t>05.10.2022 / v. 0.6.0</a:t>
+              <a:t>17.10.2022 / v. 0.7.0</a:t>
             </a:r>
           </a:p>
           <a:p>
@@ -16198,7 +16266,7 @@
         <p:spPr>
           <a:xfrm flipH="1">
             <a:off x="1872581" y="4397069"/>
-            <a:ext cx="324151" cy="0"/>
+            <a:ext cx="385340" cy="0"/>
           </a:xfrm>
           <a:prstGeom prst="straightConnector1">
             <a:avLst/>
@@ -18065,8 +18133,8 @@
         </p:nvSpPr>
         <p:spPr>
           <a:xfrm>
-            <a:off x="729398" y="3760393"/>
-            <a:ext cx="1133287" cy="298502"/>
+            <a:off x="520038" y="3760393"/>
+            <a:ext cx="1561728" cy="298502"/>
           </a:xfrm>
           <a:prstGeom prst="rect">
             <a:avLst/>
@@ -18126,8 +18194,8 @@
         </p:nvSpPr>
         <p:spPr>
           <a:xfrm>
-            <a:off x="830430" y="3726361"/>
-            <a:ext cx="1059503" cy="318398"/>
+            <a:off x="577380" y="3733449"/>
+            <a:ext cx="1536948" cy="318398"/>
           </a:xfrm>
           <a:prstGeom prst="rect">
             <a:avLst/>
@@ -18154,7 +18222,7 @@
                   <a:srgbClr val="000000"/>
                 </a:solidFill>
               </a:rPr>
-              <a:t>test configuration</a:t>
+              <a:t>Test Trigger configuration</a:t>
             </a:r>
             <a:endParaRPr kumimoji="0" lang="de-DE" sz="1000" b="1" strike="noStrike" kern="0" cap="none" spc="0" normalizeH="0" baseline="0" noProof="0" dirty="0">
               <a:ln>
@@ -18188,8 +18256,8 @@
         </p:nvCxnSpPr>
         <p:spPr>
           <a:xfrm flipH="1" flipV="1">
-            <a:off x="1296042" y="4058895"/>
-            <a:ext cx="4948" cy="206698"/>
+            <a:off x="1300902" y="4058895"/>
+            <a:ext cx="88" cy="206698"/>
           </a:xfrm>
           <a:prstGeom prst="straightConnector1">
             <a:avLst/>
@@ -18349,7 +18417,7 @@
         </p:nvCxnSpPr>
         <p:spPr>
           <a:xfrm flipH="1">
-            <a:off x="2194526" y="1440653"/>
+            <a:off x="2258318" y="1440653"/>
             <a:ext cx="5620" cy="2965543"/>
           </a:xfrm>
           <a:prstGeom prst="straightConnector1">
@@ -18394,9 +18462,9 @@
           <p:nvPr/>
         </p:nvCxnSpPr>
         <p:spPr>
-          <a:xfrm>
-            <a:off x="1483335" y="1440653"/>
-            <a:ext cx="717054" cy="1307"/>
+          <a:xfrm flipV="1">
+            <a:off x="1483335" y="1436699"/>
+            <a:ext cx="789477" cy="3954"/>
           </a:xfrm>
           <a:prstGeom prst="straightConnector1">
             <a:avLst/>
@@ -18439,9 +18507,9 @@
           <p:nvPr/>
         </p:nvCxnSpPr>
         <p:spPr>
-          <a:xfrm flipH="1" flipV="1">
-            <a:off x="2199489" y="4403737"/>
-            <a:ext cx="880537" cy="2459"/>
+          <a:xfrm flipH="1">
+            <a:off x="2257921" y="4406196"/>
+            <a:ext cx="822105" cy="0"/>
           </a:xfrm>
           <a:prstGeom prst="straightConnector1">
             <a:avLst/>
@@ -23084,23 +23152,7 @@
                   <a:srgbClr val="000000"/>
                 </a:solidFill>
               </a:rPr>
-              <a:t>Which additional json configuration file is required in command line of Database Executor (</a:t>
-            </a:r>
-            <a:r>
-              <a:rPr lang="de-DE" sz="1200" i="1" kern="0">
-                <a:solidFill>
-                  <a:srgbClr val="C00000"/>
-                </a:solidFill>
-              </a:rPr>
-              <a:t>to be clarified: test type specific or one single file for all?</a:t>
-            </a:r>
-            <a:r>
-              <a:rPr lang="de-DE" sz="1200" kern="0">
-                <a:solidFill>
-                  <a:srgbClr val="000000"/>
-                </a:solidFill>
-              </a:rPr>
-              <a:t>)</a:t>
+              <a:t>Additional (local) command lines for test execution and database access</a:t>
             </a:r>
           </a:p>
           <a:p>
@@ -23232,8 +23284,8 @@
         </p:nvSpPr>
         <p:spPr>
           <a:xfrm>
-            <a:off x="266700" y="813816"/>
-            <a:ext cx="10443300" cy="4700016"/>
+            <a:off x="266700" y="813815"/>
+            <a:ext cx="10443300" cy="4736379"/>
           </a:xfrm>
           <a:prstGeom prst="rect">
             <a:avLst/>
@@ -23426,21 +23478,6 @@
                 <a:spcPts val="0"/>
               </a:spcAft>
             </a:pPr>
-            <a:endParaRPr lang="de-DE" sz="1200" kern="0">
-              <a:solidFill>
-                <a:srgbClr val="000000"/>
-              </a:solidFill>
-            </a:endParaRPr>
-          </a:p>
-          <a:p>
-            <a:pPr lvl="1" fontAlgn="auto">
-              <a:spcBef>
-                <a:spcPts val="500"/>
-              </a:spcBef>
-              <a:spcAft>
-                <a:spcPts val="0"/>
-              </a:spcAft>
-            </a:pPr>
             <a:r>
               <a:rPr lang="de-DE" sz="1200" kern="0">
                 <a:solidFill>
@@ -23555,7 +23592,7 @@
                   <a:srgbClr val="000000"/>
                 </a:solidFill>
               </a:rPr>
-              <a:t>The full path and name of the logfile. The full path is created by the Test Executor. The xml log file is created by the involved test framework.</a:t>
+              <a:t>A local command line (optional). “local” means: only valid for the current test folder</a:t>
             </a:r>
           </a:p>
           <a:p>
@@ -23575,7 +23612,79 @@
                   <a:srgbClr val="000000"/>
                 </a:solidFill>
               </a:rPr>
+              <a:t>The full path and name of the logfile. The full path is created by the Test Executor. The xml log file is created by the involved test framework</a:t>
+            </a:r>
+          </a:p>
+          <a:p>
+            <a:pPr lvl="1" fontAlgn="auto">
+              <a:spcBef>
+                <a:spcPts val="500"/>
+              </a:spcBef>
+              <a:spcAft>
+                <a:spcPts val="0"/>
+              </a:spcAft>
+            </a:pPr>
+            <a:r>
+              <a:rPr lang="en-US" sz="1200" kern="0">
+                <a:solidFill>
+                  <a:srgbClr val="000000"/>
+                </a:solidFill>
+              </a:rPr>
               <a:t>Instead of relative paths also absolute paths or paths starting with an environment variable, are possible.</a:t>
+            </a:r>
+          </a:p>
+          <a:p>
+            <a:pPr lvl="1" fontAlgn="auto">
+              <a:spcBef>
+                <a:spcPts val="500"/>
+              </a:spcBef>
+              <a:spcAft>
+                <a:spcPts val="0"/>
+              </a:spcAft>
+            </a:pPr>
+            <a:r>
+              <a:rPr lang="en-US" sz="1200" kern="0">
+                <a:solidFill>
+                  <a:srgbClr val="000000"/>
+                </a:solidFill>
+              </a:rPr>
+              <a:t>Except the key TESTTYPE the values of all other keys are allowed to contain parameters (indicated by the </a:t>
+            </a:r>
+            <a:r>
+              <a:rPr lang="en-US" sz="1200" kern="0">
+                <a:solidFill>
+                  <a:srgbClr val="000000"/>
+                </a:solidFill>
+                <a:latin typeface="Courier New" panose="02070309020205020404" pitchFamily="49" charset="0"/>
+                <a:cs typeface="Courier New" panose="02070309020205020404" pitchFamily="49" charset="0"/>
+              </a:rPr>
+              <a:t>{…}</a:t>
+            </a:r>
+            <a:r>
+              <a:rPr lang="en-US" sz="1200" kern="0">
+                <a:solidFill>
+                  <a:srgbClr val="000000"/>
+                </a:solidFill>
+              </a:rPr>
+              <a:t> notation). Every used parameter must be set in command line of the Test Trigger with </a:t>
+            </a:r>
+            <a:r>
+              <a:rPr lang="en-US" sz="1200" kern="0">
+                <a:solidFill>
+                  <a:srgbClr val="000000"/>
+                </a:solidFill>
+                <a:latin typeface="Courier New" panose="02070309020205020404" pitchFamily="49" charset="0"/>
+                <a:cs typeface="Courier New" panose="02070309020205020404" pitchFamily="49" charset="0"/>
+              </a:rPr>
+              <a:t>--params</a:t>
+            </a:r>
+            <a:r>
+              <a:rPr lang="en-US" sz="1200" kern="0">
+                <a:solidFill>
+                  <a:srgbClr val="000000"/>
+                </a:solidFill>
+              </a:rPr>
+              <a:t>.</a:t>
             </a:r>
             <a:endParaRPr lang="de-DE" sz="1200" kern="0">
               <a:solidFill>
@@ -23587,10 +23696,10 @@
       </p:sp>
       <p:pic>
         <p:nvPicPr>
-          <p:cNvPr id="6" name="Grafik 5">
+          <p:cNvPr id="7" name="Grafik 6">
             <a:extLst>
               <a:ext uri="{FF2B5EF4-FFF2-40B4-BE49-F238E27FC236}">
-                <a16:creationId xmlns:a16="http://schemas.microsoft.com/office/drawing/2014/main" id="{B2138C6B-41DC-4E5C-B184-630990D49D34}"/>
+                <a16:creationId xmlns:a16="http://schemas.microsoft.com/office/drawing/2014/main" id="{7BFCEFE7-45DB-4405-BA60-A6BB474B949B}"/>
               </a:ext>
             </a:extLst>
           </p:cNvPr>
@@ -23607,8 +23716,8 @@
         </p:blipFill>
         <p:spPr>
           <a:xfrm>
-            <a:off x="666877" y="1627558"/>
-            <a:ext cx="9097736" cy="1399105"/>
+            <a:off x="634155" y="1532990"/>
+            <a:ext cx="8439584" cy="1403422"/>
           </a:xfrm>
           <a:prstGeom prst="rect">
             <a:avLst/>
@@ -23707,7 +23816,7 @@
         <p:spPr>
           <a:xfrm>
             <a:off x="266700" y="813816"/>
-            <a:ext cx="10443300" cy="4700016"/>
+            <a:ext cx="10443300" cy="4521509"/>
           </a:xfrm>
           <a:prstGeom prst="rect">
             <a:avLst/>
@@ -23820,22 +23929,40 @@
             </a:endParaRPr>
           </a:p>
           <a:p>
-            <a:pPr marR="0" defTabSz="914400" eaLnBrk="1" fontAlgn="auto" latinLnBrk="0" hangingPunct="1">
+            <a:pPr lvl="1" fontAlgn="auto">
               <a:spcBef>
                 <a:spcPts val="500"/>
               </a:spcBef>
               <a:spcAft>
                 <a:spcPts val="0"/>
               </a:spcAft>
-              <a:buClrTx/>
-              <a:buSzTx/>
-              <a:tabLst/>
             </a:pPr>
-            <a:endParaRPr lang="de-DE" sz="1200" b="1" kern="0">
-              <a:solidFill>
-                <a:srgbClr val="000000"/>
-              </a:solidFill>
-            </a:endParaRPr>
+            <a:r>
+              <a:rPr lang="de-DE" sz="1200" kern="0">
+                <a:solidFill>
+                  <a:srgbClr val="000000"/>
+                </a:solidFill>
+              </a:rPr>
+              <a:t>Full LOCALCOMMANDLINE:</a:t>
+            </a:r>
+          </a:p>
+          <a:p>
+            <a:pPr lvl="1" fontAlgn="auto">
+              <a:spcBef>
+                <a:spcPts val="500"/>
+              </a:spcBef>
+              <a:spcAft>
+                <a:spcPts val="0"/>
+              </a:spcAft>
+            </a:pPr>
+            <a:r>
+              <a:rPr lang="de-DE" sz="1200" kern="0">
+                <a:solidFill>
+                  <a:srgbClr val="000000"/>
+                </a:solidFill>
+              </a:rPr>
+              <a:t>"\"${server}\" \"${user}\" \"${password}\" \"${database}\" --UUID \"${UUID}\" --variant \"${variant}\" --versions \"${versions}\" --config \"${config}\""</a:t>
+            </a:r>
           </a:p>
           <a:p>
             <a:pPr lvl="1" fontAlgn="auto">
@@ -23902,18 +24029,13 @@
               <a:buChar char="•"/>
             </a:pPr>
             <a:r>
-              <a:rPr lang="de-DE" sz="1200" kern="0">
+              <a:rPr lang="en-US" sz="1200" kern="0">
                 <a:solidFill>
                   <a:srgbClr val="000000"/>
                 </a:solidFill>
               </a:rPr>
-              <a:t>The path and name of additionally used json configuration files</a:t>
-            </a:r>
-            <a:endParaRPr lang="en-US" sz="1200" kern="0">
-              <a:solidFill>
-                <a:srgbClr val="000000"/>
-              </a:solidFill>
-            </a:endParaRPr>
+              <a:t>A local command line (optional). “local” means: only valid for the current test type.</a:t>
+            </a:r>
           </a:p>
           <a:p>
             <a:pPr marL="639737" lvl="1" indent="-228600" fontAlgn="auto">
@@ -23926,25 +24048,20 @@
               <a:buFont typeface="Arial" panose="020B0604020202020204" pitchFamily="34" charset="0"/>
               <a:buChar char="•"/>
             </a:pPr>
-            <a:r>
-              <a:rPr lang="en-US" sz="1200" kern="0">
-                <a:solidFill>
-                  <a:srgbClr val="000000"/>
-                </a:solidFill>
-              </a:rPr>
-              <a:t>Additional command line parameters needed for the Database Executor</a:t>
-            </a:r>
-          </a:p>
-          <a:p>
-            <a:pPr marL="639737" lvl="1" indent="-228600" fontAlgn="auto">
+            <a:endParaRPr lang="de-DE" sz="1200" kern="0">
+              <a:solidFill>
+                <a:srgbClr val="000000"/>
+              </a:solidFill>
+            </a:endParaRPr>
+          </a:p>
+          <a:p>
+            <a:pPr lvl="1" fontAlgn="auto">
               <a:spcBef>
                 <a:spcPts val="500"/>
               </a:spcBef>
               <a:spcAft>
                 <a:spcPts val="0"/>
               </a:spcAft>
-              <a:buFont typeface="Arial" panose="020B0604020202020204" pitchFamily="34" charset="0"/>
-              <a:buChar char="•"/>
             </a:pPr>
             <a:r>
               <a:rPr lang="en-US" sz="1200" kern="0">
@@ -23953,6 +24070,60 @@
                 </a:solidFill>
               </a:rPr>
               <a:t>Instead of relative paths also absolute paths or paths starting with an environment variable, are possible.</a:t>
+            </a:r>
+          </a:p>
+          <a:p>
+            <a:pPr lvl="1" fontAlgn="auto">
+              <a:spcBef>
+                <a:spcPts val="500"/>
+              </a:spcBef>
+              <a:spcAft>
+                <a:spcPts val="0"/>
+              </a:spcAft>
+            </a:pPr>
+            <a:r>
+              <a:rPr lang="en-US" sz="1200" kern="0">
+                <a:solidFill>
+                  <a:srgbClr val="000000"/>
+                </a:solidFill>
+              </a:rPr>
+              <a:t>Both keys DATABASEEXECUTOR and LOCALCOMMANDLINE are allowed to contain parameters (indicated by the </a:t>
+            </a:r>
+            <a:r>
+              <a:rPr lang="en-US" sz="1200" kern="0">
+                <a:solidFill>
+                  <a:srgbClr val="000000"/>
+                </a:solidFill>
+                <a:latin typeface="Courier New" panose="02070309020205020404" pitchFamily="49" charset="0"/>
+                <a:cs typeface="Courier New" panose="02070309020205020404" pitchFamily="49" charset="0"/>
+              </a:rPr>
+              <a:t>{…}</a:t>
+            </a:r>
+            <a:r>
+              <a:rPr lang="en-US" sz="1200" kern="0">
+                <a:solidFill>
+                  <a:srgbClr val="000000"/>
+                </a:solidFill>
+              </a:rPr>
+              <a:t> notation). Every used parameter must be set in command line of the Test Trigger with </a:t>
+            </a:r>
+            <a:r>
+              <a:rPr lang="en-US" sz="1200" kern="0">
+                <a:solidFill>
+                  <a:srgbClr val="000000"/>
+                </a:solidFill>
+                <a:latin typeface="Courier New" panose="02070309020205020404" pitchFamily="49" charset="0"/>
+                <a:cs typeface="Courier New" panose="02070309020205020404" pitchFamily="49" charset="0"/>
+              </a:rPr>
+              <a:t>--params</a:t>
+            </a:r>
+            <a:r>
+              <a:rPr lang="en-US" sz="1200" kern="0">
+                <a:solidFill>
+                  <a:srgbClr val="000000"/>
+                </a:solidFill>
+              </a:rPr>
+              <a:t>.</a:t>
             </a:r>
             <a:endParaRPr lang="de-DE" sz="1200" kern="0">
               <a:solidFill>
@@ -23990,32 +24161,14 @@
               </a:solidFill>
             </a:endParaRPr>
           </a:p>
-          <a:p>
-            <a:pPr lvl="1" fontAlgn="auto">
-              <a:spcBef>
-                <a:spcPts val="500"/>
-              </a:spcBef>
-              <a:spcAft>
-                <a:spcPts val="0"/>
-              </a:spcAft>
-            </a:pPr>
-            <a:r>
-              <a:rPr lang="en-US" sz="1200" i="1" kern="0">
-                <a:solidFill>
-                  <a:srgbClr val="C00000"/>
-                </a:solidFill>
-              </a:rPr>
-              <a:t>This part of the Test Trigger configuration is still under construction, based on temporary mocks and needs more clarifications!</a:t>
-            </a:r>
-          </a:p>
         </p:txBody>
       </p:sp>
       <p:pic>
         <p:nvPicPr>
-          <p:cNvPr id="7" name="Grafik 6">
+          <p:cNvPr id="6" name="Grafik 5">
             <a:extLst>
               <a:ext uri="{FF2B5EF4-FFF2-40B4-BE49-F238E27FC236}">
-                <a16:creationId xmlns:a16="http://schemas.microsoft.com/office/drawing/2014/main" id="{B52A6940-4D8A-4A46-8753-465E747C978E}"/>
+                <a16:creationId xmlns:a16="http://schemas.microsoft.com/office/drawing/2014/main" id="{87513311-033A-481F-B89F-C449F529B70C}"/>
               </a:ext>
             </a:extLst>
           </p:cNvPr>
@@ -24032,8 +24185,8 @@
         </p:blipFill>
         <p:spPr>
           <a:xfrm>
-            <a:off x="670866" y="1140024"/>
-            <a:ext cx="6964374" cy="1223694"/>
+            <a:off x="554990" y="1075437"/>
+            <a:ext cx="6909155" cy="787440"/>
           </a:xfrm>
           <a:prstGeom prst="rect">
             <a:avLst/>

</xml_diff>